<commit_message>
Update meeting notes 20231115
</commit_message>
<xml_diff>
--- a/meetings/20231115/20231115 external debug security TG meeting.pptx
+++ b/meetings/20231115/20231115 external debug security TG meeting.pptx
@@ -1,21 +1,22 @@
 
 <file path=ppt/presentation.xml><?xml version="1.0" encoding="utf-8"?>
-<p:presentation xmlns:a="http://schemas.openxmlformats.org/drawingml/2006/main" xmlns:r="http://schemas.openxmlformats.org/officeDocument/2006/relationships" xmlns:mc="http://schemas.openxmlformats.org/markup-compatibility/2006" xmlns:mv="urn:schemas-microsoft-com:mac:vml" xmlns:p="http://schemas.openxmlformats.org/presentationml/2006/main" xmlns:c="http://schemas.openxmlformats.org/drawingml/2006/chart" xmlns:dgm="http://schemas.openxmlformats.org/drawingml/2006/diagram" xmlns:o="urn:schemas-microsoft-com:office:office" xmlns:v="urn:schemas-microsoft-com:vml" xmlns:pvml="urn:schemas-microsoft-com:office:powerpoint" xmlns:com="http://schemas.openxmlformats.org/drawingml/2006/compatibility" xmlns:p14="http://schemas.microsoft.com/office/powerpoint/2010/main" xmlns:p15="http://schemas.microsoft.com/office/powerpoint/2012/main" xmlns:ahyp="http://schemas.microsoft.com/office/drawing/2018/hyperlinkcolor" autoCompressPictures="0" strictFirstAndLastChars="0" saveSubsetFonts="1">
+<p:presentation xmlns:a="http://schemas.openxmlformats.org/drawingml/2006/main" xmlns:r="http://schemas.openxmlformats.org/officeDocument/2006/relationships" xmlns:p="http://schemas.openxmlformats.org/presentationml/2006/main" strictFirstAndLastChars="0" saveSubsetFonts="1" autoCompressPictures="0">
   <p:sldMasterIdLst>
-    <p:sldMasterId id="2147483659" r:id="rId4"/>
+    <p:sldMasterId id="2147483659" r:id="rId1"/>
   </p:sldMasterIdLst>
   <p:notesMasterIdLst>
-    <p:notesMasterId r:id="rId5"/>
+    <p:notesMasterId r:id="rId6"/>
   </p:notesMasterIdLst>
   <p:sldIdLst>
-    <p:sldId id="256" r:id="rId6"/>
-    <p:sldId id="257" r:id="rId7"/>
-    <p:sldId id="258" r:id="rId8"/>
+    <p:sldId id="256" r:id="rId2"/>
+    <p:sldId id="257" r:id="rId3"/>
+    <p:sldId id="258" r:id="rId4"/>
+    <p:sldId id="259" r:id="rId5"/>
   </p:sldIdLst>
-  <p:sldSz cy="5143500" cx="9144000"/>
+  <p:sldSz cx="9144000" cy="5143500" type="screen16x9"/>
   <p:notesSz cx="6858000" cy="9144000"/>
   <p:defaultTextStyle>
-    <a:defPPr lvl="0" marR="0" rtl="0" algn="l">
+    <a:defPPr marR="0" lvl="0" algn="l" rtl="0">
       <a:lnSpc>
         <a:spcPct val="100000"/>
       </a:lnSpc>
@@ -26,7 +27,7 @@
         <a:spcPts val="0"/>
       </a:spcAft>
     </a:defPPr>
-    <a:lvl1pPr lvl="0" marR="0" rtl="0" algn="l">
+    <a:lvl1pPr marR="0" lvl="0" algn="l" rtl="0">
       <a:lnSpc>
         <a:spcPct val="100000"/>
       </a:lnSpc>
@@ -40,7 +41,7 @@
         <a:srgbClr val="000000"/>
       </a:buClr>
       <a:buFont typeface="Arial"/>
-      <a:defRPr b="0" i="0" sz="1400" u="none" cap="none" strike="noStrike">
+      <a:defRPr sz="1400" b="0" i="0" u="none" strike="noStrike" cap="none">
         <a:solidFill>
           <a:srgbClr val="000000"/>
         </a:solidFill>
@@ -50,7 +51,7 @@
         <a:sym typeface="Arial"/>
       </a:defRPr>
     </a:lvl1pPr>
-    <a:lvl2pPr lvl="1" marR="0" rtl="0" algn="l">
+    <a:lvl2pPr marR="0" lvl="1" algn="l" rtl="0">
       <a:lnSpc>
         <a:spcPct val="100000"/>
       </a:lnSpc>
@@ -64,7 +65,7 @@
         <a:srgbClr val="000000"/>
       </a:buClr>
       <a:buFont typeface="Arial"/>
-      <a:defRPr b="0" i="0" sz="1400" u="none" cap="none" strike="noStrike">
+      <a:defRPr sz="1400" b="0" i="0" u="none" strike="noStrike" cap="none">
         <a:solidFill>
           <a:srgbClr val="000000"/>
         </a:solidFill>
@@ -74,7 +75,7 @@
         <a:sym typeface="Arial"/>
       </a:defRPr>
     </a:lvl2pPr>
-    <a:lvl3pPr lvl="2" marR="0" rtl="0" algn="l">
+    <a:lvl3pPr marR="0" lvl="2" algn="l" rtl="0">
       <a:lnSpc>
         <a:spcPct val="100000"/>
       </a:lnSpc>
@@ -88,7 +89,7 @@
         <a:srgbClr val="000000"/>
       </a:buClr>
       <a:buFont typeface="Arial"/>
-      <a:defRPr b="0" i="0" sz="1400" u="none" cap="none" strike="noStrike">
+      <a:defRPr sz="1400" b="0" i="0" u="none" strike="noStrike" cap="none">
         <a:solidFill>
           <a:srgbClr val="000000"/>
         </a:solidFill>
@@ -98,7 +99,7 @@
         <a:sym typeface="Arial"/>
       </a:defRPr>
     </a:lvl3pPr>
-    <a:lvl4pPr lvl="3" marR="0" rtl="0" algn="l">
+    <a:lvl4pPr marR="0" lvl="3" algn="l" rtl="0">
       <a:lnSpc>
         <a:spcPct val="100000"/>
       </a:lnSpc>
@@ -112,7 +113,7 @@
         <a:srgbClr val="000000"/>
       </a:buClr>
       <a:buFont typeface="Arial"/>
-      <a:defRPr b="0" i="0" sz="1400" u="none" cap="none" strike="noStrike">
+      <a:defRPr sz="1400" b="0" i="0" u="none" strike="noStrike" cap="none">
         <a:solidFill>
           <a:srgbClr val="000000"/>
         </a:solidFill>
@@ -122,7 +123,7 @@
         <a:sym typeface="Arial"/>
       </a:defRPr>
     </a:lvl4pPr>
-    <a:lvl5pPr lvl="4" marR="0" rtl="0" algn="l">
+    <a:lvl5pPr marR="0" lvl="4" algn="l" rtl="0">
       <a:lnSpc>
         <a:spcPct val="100000"/>
       </a:lnSpc>
@@ -136,7 +137,7 @@
         <a:srgbClr val="000000"/>
       </a:buClr>
       <a:buFont typeface="Arial"/>
-      <a:defRPr b="0" i="0" sz="1400" u="none" cap="none" strike="noStrike">
+      <a:defRPr sz="1400" b="0" i="0" u="none" strike="noStrike" cap="none">
         <a:solidFill>
           <a:srgbClr val="000000"/>
         </a:solidFill>
@@ -146,7 +147,7 @@
         <a:sym typeface="Arial"/>
       </a:defRPr>
     </a:lvl5pPr>
-    <a:lvl6pPr lvl="5" marR="0" rtl="0" algn="l">
+    <a:lvl6pPr marR="0" lvl="5" algn="l" rtl="0">
       <a:lnSpc>
         <a:spcPct val="100000"/>
       </a:lnSpc>
@@ -160,7 +161,7 @@
         <a:srgbClr val="000000"/>
       </a:buClr>
       <a:buFont typeface="Arial"/>
-      <a:defRPr b="0" i="0" sz="1400" u="none" cap="none" strike="noStrike">
+      <a:defRPr sz="1400" b="0" i="0" u="none" strike="noStrike" cap="none">
         <a:solidFill>
           <a:srgbClr val="000000"/>
         </a:solidFill>
@@ -170,7 +171,7 @@
         <a:sym typeface="Arial"/>
       </a:defRPr>
     </a:lvl6pPr>
-    <a:lvl7pPr lvl="6" marR="0" rtl="0" algn="l">
+    <a:lvl7pPr marR="0" lvl="6" algn="l" rtl="0">
       <a:lnSpc>
         <a:spcPct val="100000"/>
       </a:lnSpc>
@@ -184,7 +185,7 @@
         <a:srgbClr val="000000"/>
       </a:buClr>
       <a:buFont typeface="Arial"/>
-      <a:defRPr b="0" i="0" sz="1400" u="none" cap="none" strike="noStrike">
+      <a:defRPr sz="1400" b="0" i="0" u="none" strike="noStrike" cap="none">
         <a:solidFill>
           <a:srgbClr val="000000"/>
         </a:solidFill>
@@ -194,7 +195,7 @@
         <a:sym typeface="Arial"/>
       </a:defRPr>
     </a:lvl7pPr>
-    <a:lvl8pPr lvl="7" marR="0" rtl="0" algn="l">
+    <a:lvl8pPr marR="0" lvl="7" algn="l" rtl="0">
       <a:lnSpc>
         <a:spcPct val="100000"/>
       </a:lnSpc>
@@ -208,7 +209,7 @@
         <a:srgbClr val="000000"/>
       </a:buClr>
       <a:buFont typeface="Arial"/>
-      <a:defRPr b="0" i="0" sz="1400" u="none" cap="none" strike="noStrike">
+      <a:defRPr sz="1400" b="0" i="0" u="none" strike="noStrike" cap="none">
         <a:solidFill>
           <a:srgbClr val="000000"/>
         </a:solidFill>
@@ -218,7 +219,7 @@
         <a:sym typeface="Arial"/>
       </a:defRPr>
     </a:lvl8pPr>
-    <a:lvl9pPr lvl="8" marR="0" rtl="0" algn="l">
+    <a:lvl9pPr marR="0" lvl="8" algn="l" rtl="0">
       <a:lnSpc>
         <a:spcPct val="100000"/>
       </a:lnSpc>
@@ -232,7 +233,7 @@
         <a:srgbClr val="000000"/>
       </a:buClr>
       <a:buFont typeface="Arial"/>
-      <a:defRPr b="0" i="0" sz="1400" u="none" cap="none" strike="noStrike">
+      <a:defRPr sz="1400" b="0" i="0" u="none" strike="noStrike" cap="none">
         <a:solidFill>
           <a:srgbClr val="000000"/>
         </a:solidFill>
@@ -245,7 +246,7 @@
   </p:defaultTextStyle>
   <p:extLst>
     <p:ext uri="{EFAFB233-063F-42B5-8137-9DF3F51BA10A}">
-      <p15:sldGuideLst>
+      <p15:sldGuideLst xmlns:p15="http://schemas.microsoft.com/office/powerpoint/2012/main">
         <p15:guide id="1" orient="horz" pos="1620">
           <p15:clr>
             <a:srgbClr val="747775"/>
@@ -263,11 +264,16 @@
 </file>
 
 <file path=ppt/notesMasters/notesMaster1.xml><?xml version="1.0" encoding="utf-8"?>
-<p:notesMaster xmlns:a="http://schemas.openxmlformats.org/drawingml/2006/main" xmlns:r="http://schemas.openxmlformats.org/officeDocument/2006/relationships" xmlns:mc="http://schemas.openxmlformats.org/markup-compatibility/2006" xmlns:mv="urn:schemas-microsoft-com:mac:vml" xmlns:p="http://schemas.openxmlformats.org/presentationml/2006/main" xmlns:c="http://schemas.openxmlformats.org/drawingml/2006/chart" xmlns:dgm="http://schemas.openxmlformats.org/drawingml/2006/diagram" xmlns:o="urn:schemas-microsoft-com:office:office" xmlns:v="urn:schemas-microsoft-com:vml" xmlns:pvml="urn:schemas-microsoft-com:office:powerpoint" xmlns:com="http://schemas.openxmlformats.org/drawingml/2006/compatibility" xmlns:p14="http://schemas.microsoft.com/office/powerpoint/2010/main" xmlns:p15="http://schemas.microsoft.com/office/powerpoint/2012/main" xmlns:ahyp="http://schemas.microsoft.com/office/drawing/2018/hyperlinkcolor">
+<p:notesMaster xmlns:a="http://schemas.openxmlformats.org/drawingml/2006/main" xmlns:r="http://schemas.openxmlformats.org/officeDocument/2006/relationships" xmlns:p="http://schemas.openxmlformats.org/presentationml/2006/main">
   <p:cSld>
+    <p:bg>
+      <p:bgRef idx="1001">
+        <a:schemeClr val="bg1"/>
+      </p:bgRef>
+    </p:bg>
     <p:spTree>
       <p:nvGrpSpPr>
-        <p:cNvPr id="2" name="Shape 2"/>
+        <p:cNvPr id="1" name="Shape 2"/>
         <p:cNvGrpSpPr/>
         <p:nvPr/>
       </p:nvGrpSpPr>
@@ -282,9 +288,11 @@
       <p:sp>
         <p:nvSpPr>
           <p:cNvPr id="3" name="Google Shape;3;n"/>
-          <p:cNvSpPr/>
+          <p:cNvSpPr>
+            <a:spLocks noGrp="1" noRot="1" noChangeAspect="1"/>
+          </p:cNvSpPr>
           <p:nvPr>
-            <p:ph idx="2" type="sldImg"/>
+            <p:ph type="sldImg" idx="2"/>
           </p:nvPr>
         </p:nvSpPr>
         <p:spPr>
@@ -293,9 +301,13 @@
             <a:ext cx="6096075" cy="3429000"/>
           </a:xfrm>
           <a:custGeom>
-            <a:rect b="b" l="l" r="r" t="t"/>
+            <a:avLst/>
+            <a:gdLst/>
+            <a:ahLst/>
+            <a:cxnLst/>
+            <a:rect l="l" t="t" r="r" b="b"/>
             <a:pathLst>
-              <a:path extrusionOk="0" h="120000" w="120000">
+              <a:path w="120000" h="120000" extrusionOk="0">
                 <a:moveTo>
                   <a:pt x="0" y="0"/>
                 </a:moveTo>
@@ -313,23 +325,25 @@
             </a:pathLst>
           </a:custGeom>
           <a:noFill/>
-          <a:ln cap="flat" cmpd="sng" w="9525">
+          <a:ln w="9525" cap="flat" cmpd="sng">
             <a:solidFill>
               <a:srgbClr val="000000"/>
             </a:solidFill>
             <a:prstDash val="solid"/>
             <a:round/>
-            <a:headEnd len="sm" w="sm" type="none"/>
-            <a:tailEnd len="sm" w="sm" type="none"/>
+            <a:headEnd type="none" w="sm" len="sm"/>
+            <a:tailEnd type="none" w="sm" len="sm"/>
           </a:ln>
         </p:spPr>
       </p:sp>
       <p:sp>
         <p:nvSpPr>
           <p:cNvPr id="4" name="Google Shape;4;n"/>
-          <p:cNvSpPr txBox="1"/>
+          <p:cNvSpPr txBox="1">
+            <a:spLocks noGrp="1"/>
+          </p:cNvSpPr>
           <p:nvPr>
-            <p:ph idx="1" type="body"/>
+            <p:ph type="body" idx="1"/>
           </p:nvPr>
         </p:nvSpPr>
         <p:spPr>
@@ -346,11 +360,11 @@
           </a:ln>
         </p:spPr>
         <p:txBody>
-          <a:bodyPr anchorCtr="0" anchor="t" bIns="91425" lIns="91425" spcFirstLastPara="1" rIns="91425" wrap="square" tIns="91425">
+          <a:bodyPr spcFirstLastPara="1" wrap="square" lIns="91425" tIns="91425" rIns="91425" bIns="91425" anchor="t" anchorCtr="0">
             <a:noAutofit/>
           </a:bodyPr>
           <a:lstStyle>
-            <a:lvl1pPr indent="-298450" lvl="0" marL="457200">
+            <a:lvl1pPr marL="457200" lvl="0" indent="-298450">
               <a:spcBef>
                 <a:spcPts val="0"/>
               </a:spcBef>
@@ -361,7 +375,7 @@
               <a:buChar char="●"/>
               <a:defRPr sz="1100"/>
             </a:lvl1pPr>
-            <a:lvl2pPr indent="-298450" lvl="1" marL="914400">
+            <a:lvl2pPr marL="914400" lvl="1" indent="-298450">
               <a:spcBef>
                 <a:spcPts val="0"/>
               </a:spcBef>
@@ -372,7 +386,7 @@
               <a:buChar char="○"/>
               <a:defRPr sz="1100"/>
             </a:lvl2pPr>
-            <a:lvl3pPr indent="-298450" lvl="2" marL="1371600">
+            <a:lvl3pPr marL="1371600" lvl="2" indent="-298450">
               <a:spcBef>
                 <a:spcPts val="0"/>
               </a:spcBef>
@@ -383,7 +397,7 @@
               <a:buChar char="■"/>
               <a:defRPr sz="1100"/>
             </a:lvl3pPr>
-            <a:lvl4pPr indent="-298450" lvl="3" marL="1828800">
+            <a:lvl4pPr marL="1828800" lvl="3" indent="-298450">
               <a:spcBef>
                 <a:spcPts val="0"/>
               </a:spcBef>
@@ -394,7 +408,7 @@
               <a:buChar char="●"/>
               <a:defRPr sz="1100"/>
             </a:lvl4pPr>
-            <a:lvl5pPr indent="-298450" lvl="4" marL="2286000">
+            <a:lvl5pPr marL="2286000" lvl="4" indent="-298450">
               <a:spcBef>
                 <a:spcPts val="0"/>
               </a:spcBef>
@@ -405,7 +419,7 @@
               <a:buChar char="○"/>
               <a:defRPr sz="1100"/>
             </a:lvl5pPr>
-            <a:lvl6pPr indent="-298450" lvl="5" marL="2743200">
+            <a:lvl6pPr marL="2743200" lvl="5" indent="-298450">
               <a:spcBef>
                 <a:spcPts val="0"/>
               </a:spcBef>
@@ -416,7 +430,7 @@
               <a:buChar char="■"/>
               <a:defRPr sz="1100"/>
             </a:lvl6pPr>
-            <a:lvl7pPr indent="-298450" lvl="6" marL="3200400">
+            <a:lvl7pPr marL="3200400" lvl="6" indent="-298450">
               <a:spcBef>
                 <a:spcPts val="0"/>
               </a:spcBef>
@@ -427,7 +441,7 @@
               <a:buChar char="●"/>
               <a:defRPr sz="1100"/>
             </a:lvl7pPr>
-            <a:lvl8pPr indent="-298450" lvl="7" marL="3657600">
+            <a:lvl8pPr marL="3657600" lvl="7" indent="-298450">
               <a:spcBef>
                 <a:spcPts val="0"/>
               </a:spcBef>
@@ -438,7 +452,7 @@
               <a:buChar char="○"/>
               <a:defRPr sz="1100"/>
             </a:lvl8pPr>
-            <a:lvl9pPr indent="-298450" lvl="8" marL="4114800">
+            <a:lvl9pPr marL="4114800" lvl="8" indent="-298450">
               <a:spcBef>
                 <a:spcPts val="0"/>
               </a:spcBef>
@@ -450,14 +464,16 @@
               <a:defRPr sz="1100"/>
             </a:lvl9pPr>
           </a:lstStyle>
-          <a:p/>
+          <a:p>
+            <a:endParaRPr/>
+          </a:p>
         </p:txBody>
       </p:sp>
     </p:spTree>
   </p:cSld>
-  <p:clrMap accent1="accent1" accent2="accent2" accent3="accent3" accent4="accent4" accent5="accent5" accent6="accent6" bg1="lt1" bg2="dk2" tx1="dk1" tx2="lt2" folHlink="folHlink" hlink="hlink"/>
+  <p:clrMap bg1="lt1" tx1="dk1" bg2="dk2" tx2="lt2" accent1="accent1" accent2="accent2" accent3="accent3" accent4="accent4" accent5="accent5" accent6="accent6" hlink="hlink" folHlink="folHlink"/>
   <p:notesStyle>
-    <a:defPPr lvl="0" marR="0" rtl="0" algn="l">
+    <a:defPPr marR="0" lvl="0" algn="l" rtl="0">
       <a:lnSpc>
         <a:spcPct val="100000"/>
       </a:lnSpc>
@@ -468,7 +484,7 @@
         <a:spcPts val="0"/>
       </a:spcAft>
     </a:defPPr>
-    <a:lvl1pPr lvl="0" marR="0" rtl="0" algn="l">
+    <a:lvl1pPr marR="0" lvl="0" algn="l" rtl="0">
       <a:lnSpc>
         <a:spcPct val="100000"/>
       </a:lnSpc>
@@ -482,7 +498,7 @@
         <a:srgbClr val="000000"/>
       </a:buClr>
       <a:buFont typeface="Arial"/>
-      <a:defRPr b="0" i="0" sz="1400" u="none" cap="none" strike="noStrike">
+      <a:defRPr sz="1400" b="0" i="0" u="none" strike="noStrike" cap="none">
         <a:solidFill>
           <a:srgbClr val="000000"/>
         </a:solidFill>
@@ -492,7 +508,7 @@
         <a:sym typeface="Arial"/>
       </a:defRPr>
     </a:lvl1pPr>
-    <a:lvl2pPr lvl="1" marR="0" rtl="0" algn="l">
+    <a:lvl2pPr marR="0" lvl="1" algn="l" rtl="0">
       <a:lnSpc>
         <a:spcPct val="100000"/>
       </a:lnSpc>
@@ -506,7 +522,7 @@
         <a:srgbClr val="000000"/>
       </a:buClr>
       <a:buFont typeface="Arial"/>
-      <a:defRPr b="0" i="0" sz="1400" u="none" cap="none" strike="noStrike">
+      <a:defRPr sz="1400" b="0" i="0" u="none" strike="noStrike" cap="none">
         <a:solidFill>
           <a:srgbClr val="000000"/>
         </a:solidFill>
@@ -516,7 +532,7 @@
         <a:sym typeface="Arial"/>
       </a:defRPr>
     </a:lvl2pPr>
-    <a:lvl3pPr lvl="2" marR="0" rtl="0" algn="l">
+    <a:lvl3pPr marR="0" lvl="2" algn="l" rtl="0">
       <a:lnSpc>
         <a:spcPct val="100000"/>
       </a:lnSpc>
@@ -530,7 +546,7 @@
         <a:srgbClr val="000000"/>
       </a:buClr>
       <a:buFont typeface="Arial"/>
-      <a:defRPr b="0" i="0" sz="1400" u="none" cap="none" strike="noStrike">
+      <a:defRPr sz="1400" b="0" i="0" u="none" strike="noStrike" cap="none">
         <a:solidFill>
           <a:srgbClr val="000000"/>
         </a:solidFill>
@@ -540,7 +556,7 @@
         <a:sym typeface="Arial"/>
       </a:defRPr>
     </a:lvl3pPr>
-    <a:lvl4pPr lvl="3" marR="0" rtl="0" algn="l">
+    <a:lvl4pPr marR="0" lvl="3" algn="l" rtl="0">
       <a:lnSpc>
         <a:spcPct val="100000"/>
       </a:lnSpc>
@@ -554,7 +570,7 @@
         <a:srgbClr val="000000"/>
       </a:buClr>
       <a:buFont typeface="Arial"/>
-      <a:defRPr b="0" i="0" sz="1400" u="none" cap="none" strike="noStrike">
+      <a:defRPr sz="1400" b="0" i="0" u="none" strike="noStrike" cap="none">
         <a:solidFill>
           <a:srgbClr val="000000"/>
         </a:solidFill>
@@ -564,7 +580,7 @@
         <a:sym typeface="Arial"/>
       </a:defRPr>
     </a:lvl4pPr>
-    <a:lvl5pPr lvl="4" marR="0" rtl="0" algn="l">
+    <a:lvl5pPr marR="0" lvl="4" algn="l" rtl="0">
       <a:lnSpc>
         <a:spcPct val="100000"/>
       </a:lnSpc>
@@ -578,7 +594,7 @@
         <a:srgbClr val="000000"/>
       </a:buClr>
       <a:buFont typeface="Arial"/>
-      <a:defRPr b="0" i="0" sz="1400" u="none" cap="none" strike="noStrike">
+      <a:defRPr sz="1400" b="0" i="0" u="none" strike="noStrike" cap="none">
         <a:solidFill>
           <a:srgbClr val="000000"/>
         </a:solidFill>
@@ -588,7 +604,7 @@
         <a:sym typeface="Arial"/>
       </a:defRPr>
     </a:lvl5pPr>
-    <a:lvl6pPr lvl="5" marR="0" rtl="0" algn="l">
+    <a:lvl6pPr marR="0" lvl="5" algn="l" rtl="0">
       <a:lnSpc>
         <a:spcPct val="100000"/>
       </a:lnSpc>
@@ -602,7 +618,7 @@
         <a:srgbClr val="000000"/>
       </a:buClr>
       <a:buFont typeface="Arial"/>
-      <a:defRPr b="0" i="0" sz="1400" u="none" cap="none" strike="noStrike">
+      <a:defRPr sz="1400" b="0" i="0" u="none" strike="noStrike" cap="none">
         <a:solidFill>
           <a:srgbClr val="000000"/>
         </a:solidFill>
@@ -612,7 +628,7 @@
         <a:sym typeface="Arial"/>
       </a:defRPr>
     </a:lvl6pPr>
-    <a:lvl7pPr lvl="6" marR="0" rtl="0" algn="l">
+    <a:lvl7pPr marR="0" lvl="6" algn="l" rtl="0">
       <a:lnSpc>
         <a:spcPct val="100000"/>
       </a:lnSpc>
@@ -626,7 +642,7 @@
         <a:srgbClr val="000000"/>
       </a:buClr>
       <a:buFont typeface="Arial"/>
-      <a:defRPr b="0" i="0" sz="1400" u="none" cap="none" strike="noStrike">
+      <a:defRPr sz="1400" b="0" i="0" u="none" strike="noStrike" cap="none">
         <a:solidFill>
           <a:srgbClr val="000000"/>
         </a:solidFill>
@@ -636,7 +652,7 @@
         <a:sym typeface="Arial"/>
       </a:defRPr>
     </a:lvl7pPr>
-    <a:lvl8pPr lvl="7" marR="0" rtl="0" algn="l">
+    <a:lvl8pPr marR="0" lvl="7" algn="l" rtl="0">
       <a:lnSpc>
         <a:spcPct val="100000"/>
       </a:lnSpc>
@@ -650,7 +666,7 @@
         <a:srgbClr val="000000"/>
       </a:buClr>
       <a:buFont typeface="Arial"/>
-      <a:defRPr b="0" i="0" sz="1400" u="none" cap="none" strike="noStrike">
+      <a:defRPr sz="1400" b="0" i="0" u="none" strike="noStrike" cap="none">
         <a:solidFill>
           <a:srgbClr val="000000"/>
         </a:solidFill>
@@ -660,7 +676,7 @@
         <a:sym typeface="Arial"/>
       </a:defRPr>
     </a:lvl8pPr>
-    <a:lvl9pPr lvl="8" marR="0" rtl="0" algn="l">
+    <a:lvl9pPr marR="0" lvl="8" algn="l" rtl="0">
       <a:lnSpc>
         <a:spcPct val="100000"/>
       </a:lnSpc>
@@ -674,7 +690,7 @@
         <a:srgbClr val="000000"/>
       </a:buClr>
       <a:buFont typeface="Arial"/>
-      <a:defRPr b="0" i="0" sz="1400" u="none" cap="none" strike="noStrike">
+      <a:defRPr sz="1400" b="0" i="0" u="none" strike="noStrike" cap="none">
         <a:solidFill>
           <a:srgbClr val="000000"/>
         </a:solidFill>
@@ -689,11 +705,11 @@
 </file>
 
 <file path=ppt/notesSlides/notesSlide1.xml><?xml version="1.0" encoding="utf-8"?>
-<p:notes xmlns:a="http://schemas.openxmlformats.org/drawingml/2006/main" xmlns:r="http://schemas.openxmlformats.org/officeDocument/2006/relationships" xmlns:mc="http://schemas.openxmlformats.org/markup-compatibility/2006" xmlns:mv="urn:schemas-microsoft-com:mac:vml" xmlns:p="http://schemas.openxmlformats.org/presentationml/2006/main" xmlns:c="http://schemas.openxmlformats.org/drawingml/2006/chart" xmlns:dgm="http://schemas.openxmlformats.org/drawingml/2006/diagram" xmlns:o="urn:schemas-microsoft-com:office:office" xmlns:v="urn:schemas-microsoft-com:vml" xmlns:pvml="urn:schemas-microsoft-com:office:powerpoint" xmlns:com="http://schemas.openxmlformats.org/drawingml/2006/compatibility" xmlns:p14="http://schemas.microsoft.com/office/powerpoint/2010/main" xmlns:p15="http://schemas.microsoft.com/office/powerpoint/2012/main" xmlns:ahyp="http://schemas.microsoft.com/office/drawing/2018/hyperlinkcolor" showMasterPhAnim="0" showMasterSp="0">
+<p:notes xmlns:a="http://schemas.openxmlformats.org/drawingml/2006/main" xmlns:r="http://schemas.openxmlformats.org/officeDocument/2006/relationships" xmlns:p="http://schemas.openxmlformats.org/presentationml/2006/main" showMasterSp="0" showMasterPhAnim="0">
   <p:cSld>
     <p:spTree>
       <p:nvGrpSpPr>
-        <p:cNvPr id="50" name="Shape 50"/>
+        <p:cNvPr id="1" name="Shape 50"/>
         <p:cNvGrpSpPr/>
         <p:nvPr/>
       </p:nvGrpSpPr>
@@ -708,9 +724,11 @@
       <p:sp>
         <p:nvSpPr>
           <p:cNvPr id="51" name="Google Shape;51;p:notes"/>
-          <p:cNvSpPr/>
+          <p:cNvSpPr>
+            <a:spLocks noGrp="1" noRot="1" noChangeAspect="1"/>
+          </p:cNvSpPr>
           <p:nvPr>
-            <p:ph idx="2" type="sldImg"/>
+            <p:ph type="sldImg" idx="2"/>
           </p:nvPr>
         </p:nvSpPr>
         <p:spPr>
@@ -719,9 +737,13 @@
             <a:ext cx="6096075" cy="3429000"/>
           </a:xfrm>
           <a:custGeom>
-            <a:rect b="b" l="l" r="r" t="t"/>
+            <a:avLst/>
+            <a:gdLst/>
+            <a:ahLst/>
+            <a:cxnLst/>
+            <a:rect l="l" t="t" r="r" b="b"/>
             <a:pathLst>
-              <a:path extrusionOk="0" h="120000" w="120000">
+              <a:path w="120000" h="120000" extrusionOk="0">
                 <a:moveTo>
                   <a:pt x="0" y="0"/>
                 </a:moveTo>
@@ -743,9 +765,11 @@
       <p:sp>
         <p:nvSpPr>
           <p:cNvPr id="52" name="Google Shape;52;p:notes"/>
-          <p:cNvSpPr txBox="1"/>
+          <p:cNvSpPr txBox="1">
+            <a:spLocks noGrp="1"/>
+          </p:cNvSpPr>
           <p:nvPr>
-            <p:ph idx="1" type="body"/>
+            <p:ph type="body" idx="1"/>
           </p:nvPr>
         </p:nvSpPr>
         <p:spPr>
@@ -758,12 +782,12 @@
           </a:prstGeom>
         </p:spPr>
         <p:txBody>
-          <a:bodyPr anchorCtr="0" anchor="t" bIns="91425" lIns="91425" spcFirstLastPara="1" rIns="91425" wrap="square" tIns="91425">
+          <a:bodyPr spcFirstLastPara="1" wrap="square" lIns="91425" tIns="91425" rIns="91425" bIns="91425" anchor="t" anchorCtr="0">
             <a:noAutofit/>
           </a:bodyPr>
           <a:lstStyle/>
           <a:p>
-            <a:pPr indent="0" lvl="0" marL="0" rtl="0" algn="l">
+            <a:pPr marL="0" lvl="0" indent="0" algn="l" rtl="0">
               <a:spcBef>
                 <a:spcPts val="0"/>
               </a:spcBef>
@@ -772,9 +796,6 @@
               </a:spcAft>
               <a:buNone/>
             </a:pPr>
-            <a:r>
-              <a:t/>
-            </a:r>
             <a:endParaRPr/>
           </a:p>
         </p:txBody>
@@ -788,11 +809,11 @@
 </file>
 
 <file path=ppt/notesSlides/notesSlide2.xml><?xml version="1.0" encoding="utf-8"?>
-<p:notes xmlns:a="http://schemas.openxmlformats.org/drawingml/2006/main" xmlns:r="http://schemas.openxmlformats.org/officeDocument/2006/relationships" xmlns:mc="http://schemas.openxmlformats.org/markup-compatibility/2006" xmlns:mv="urn:schemas-microsoft-com:mac:vml" xmlns:p="http://schemas.openxmlformats.org/presentationml/2006/main" xmlns:c="http://schemas.openxmlformats.org/drawingml/2006/chart" xmlns:dgm="http://schemas.openxmlformats.org/drawingml/2006/diagram" xmlns:o="urn:schemas-microsoft-com:office:office" xmlns:v="urn:schemas-microsoft-com:vml" xmlns:pvml="urn:schemas-microsoft-com:office:powerpoint" xmlns:com="http://schemas.openxmlformats.org/drawingml/2006/compatibility" xmlns:p14="http://schemas.microsoft.com/office/powerpoint/2010/main" xmlns:p15="http://schemas.microsoft.com/office/powerpoint/2012/main" xmlns:ahyp="http://schemas.microsoft.com/office/drawing/2018/hyperlinkcolor" showMasterPhAnim="0" showMasterSp="0">
+<p:notes xmlns:a="http://schemas.openxmlformats.org/drawingml/2006/main" xmlns:r="http://schemas.openxmlformats.org/officeDocument/2006/relationships" xmlns:p="http://schemas.openxmlformats.org/presentationml/2006/main" showMasterSp="0" showMasterPhAnim="0">
   <p:cSld>
     <p:spTree>
       <p:nvGrpSpPr>
-        <p:cNvPr id="56" name="Shape 56"/>
+        <p:cNvPr id="1" name="Shape 56"/>
         <p:cNvGrpSpPr/>
         <p:nvPr/>
       </p:nvGrpSpPr>
@@ -807,20 +828,26 @@
       <p:sp>
         <p:nvSpPr>
           <p:cNvPr id="57" name="Google Shape;57;g29b8245a483_0_0:notes"/>
-          <p:cNvSpPr/>
+          <p:cNvSpPr>
+            <a:spLocks noGrp="1" noRot="1" noChangeAspect="1"/>
+          </p:cNvSpPr>
           <p:nvPr>
-            <p:ph idx="2" type="sldImg"/>
+            <p:ph type="sldImg" idx="2"/>
           </p:nvPr>
         </p:nvSpPr>
         <p:spPr>
           <a:xfrm>
-            <a:off x="381300" y="685800"/>
+            <a:off x="381000" y="685800"/>
             <a:ext cx="6096000" cy="3429000"/>
           </a:xfrm>
           <a:custGeom>
-            <a:rect b="b" l="l" r="r" t="t"/>
+            <a:avLst/>
+            <a:gdLst/>
+            <a:ahLst/>
+            <a:cxnLst/>
+            <a:rect l="l" t="t" r="r" b="b"/>
             <a:pathLst>
-              <a:path extrusionOk="0" h="120000" w="120000">
+              <a:path w="120000" h="120000" extrusionOk="0">
                 <a:moveTo>
                   <a:pt x="0" y="0"/>
                 </a:moveTo>
@@ -842,9 +869,11 @@
       <p:sp>
         <p:nvSpPr>
           <p:cNvPr id="58" name="Google Shape;58;g29b8245a483_0_0:notes"/>
-          <p:cNvSpPr txBox="1"/>
+          <p:cNvSpPr txBox="1">
+            <a:spLocks noGrp="1"/>
+          </p:cNvSpPr>
           <p:nvPr>
-            <p:ph idx="1" type="body"/>
+            <p:ph type="body" idx="1"/>
           </p:nvPr>
         </p:nvSpPr>
         <p:spPr>
@@ -857,12 +886,12 @@
           </a:prstGeom>
         </p:spPr>
         <p:txBody>
-          <a:bodyPr anchorCtr="0" anchor="t" bIns="91425" lIns="91425" spcFirstLastPara="1" rIns="91425" wrap="square" tIns="91425">
+          <a:bodyPr spcFirstLastPara="1" wrap="square" lIns="91425" tIns="91425" rIns="91425" bIns="91425" anchor="t" anchorCtr="0">
             <a:noAutofit/>
           </a:bodyPr>
           <a:lstStyle/>
           <a:p>
-            <a:pPr indent="0" lvl="0" marL="0" rtl="0" algn="l">
+            <a:pPr marL="0" lvl="0" indent="0" algn="l" rtl="0">
               <a:spcBef>
                 <a:spcPts val="0"/>
               </a:spcBef>
@@ -871,9 +900,6 @@
               </a:spcAft>
               <a:buNone/>
             </a:pPr>
-            <a:r>
-              <a:t/>
-            </a:r>
             <a:endParaRPr/>
           </a:p>
         </p:txBody>
@@ -887,11 +913,11 @@
 </file>
 
 <file path=ppt/notesSlides/notesSlide3.xml><?xml version="1.0" encoding="utf-8"?>
-<p:notes xmlns:a="http://schemas.openxmlformats.org/drawingml/2006/main" xmlns:r="http://schemas.openxmlformats.org/officeDocument/2006/relationships" xmlns:mc="http://schemas.openxmlformats.org/markup-compatibility/2006" xmlns:mv="urn:schemas-microsoft-com:mac:vml" xmlns:p="http://schemas.openxmlformats.org/presentationml/2006/main" xmlns:c="http://schemas.openxmlformats.org/drawingml/2006/chart" xmlns:dgm="http://schemas.openxmlformats.org/drawingml/2006/diagram" xmlns:o="urn:schemas-microsoft-com:office:office" xmlns:v="urn:schemas-microsoft-com:vml" xmlns:pvml="urn:schemas-microsoft-com:office:powerpoint" xmlns:com="http://schemas.openxmlformats.org/drawingml/2006/compatibility" xmlns:p14="http://schemas.microsoft.com/office/powerpoint/2010/main" xmlns:p15="http://schemas.microsoft.com/office/powerpoint/2012/main" xmlns:ahyp="http://schemas.microsoft.com/office/drawing/2018/hyperlinkcolor" showMasterPhAnim="0" showMasterSp="0">
+<p:notes xmlns:a="http://schemas.openxmlformats.org/drawingml/2006/main" xmlns:r="http://schemas.openxmlformats.org/officeDocument/2006/relationships" xmlns:p="http://schemas.openxmlformats.org/presentationml/2006/main" showMasterSp="0" showMasterPhAnim="0">
   <p:cSld>
     <p:spTree>
       <p:nvGrpSpPr>
-        <p:cNvPr id="62" name="Shape 62"/>
+        <p:cNvPr id="1" name="Shape 62"/>
         <p:cNvGrpSpPr/>
         <p:nvPr/>
       </p:nvGrpSpPr>
@@ -906,20 +932,26 @@
       <p:sp>
         <p:nvSpPr>
           <p:cNvPr id="63" name="Google Shape;63;g29b8245a483_0_5:notes"/>
-          <p:cNvSpPr/>
+          <p:cNvSpPr>
+            <a:spLocks noGrp="1" noRot="1" noChangeAspect="1"/>
+          </p:cNvSpPr>
           <p:nvPr>
-            <p:ph idx="2" type="sldImg"/>
+            <p:ph type="sldImg" idx="2"/>
           </p:nvPr>
         </p:nvSpPr>
         <p:spPr>
           <a:xfrm>
-            <a:off x="381300" y="685800"/>
+            <a:off x="381000" y="685800"/>
             <a:ext cx="6096000" cy="3429000"/>
           </a:xfrm>
           <a:custGeom>
-            <a:rect b="b" l="l" r="r" t="t"/>
+            <a:avLst/>
+            <a:gdLst/>
+            <a:ahLst/>
+            <a:cxnLst/>
+            <a:rect l="l" t="t" r="r" b="b"/>
             <a:pathLst>
-              <a:path extrusionOk="0" h="120000" w="120000">
+              <a:path w="120000" h="120000" extrusionOk="0">
                 <a:moveTo>
                   <a:pt x="0" y="0"/>
                 </a:moveTo>
@@ -941,9 +973,11 @@
       <p:sp>
         <p:nvSpPr>
           <p:cNvPr id="64" name="Google Shape;64;g29b8245a483_0_5:notes"/>
-          <p:cNvSpPr txBox="1"/>
+          <p:cNvSpPr txBox="1">
+            <a:spLocks noGrp="1"/>
+          </p:cNvSpPr>
           <p:nvPr>
-            <p:ph idx="1" type="body"/>
+            <p:ph type="body" idx="1"/>
           </p:nvPr>
         </p:nvSpPr>
         <p:spPr>
@@ -956,12 +990,12 @@
           </a:prstGeom>
         </p:spPr>
         <p:txBody>
-          <a:bodyPr anchorCtr="0" anchor="t" bIns="91425" lIns="91425" spcFirstLastPara="1" rIns="91425" wrap="square" tIns="91425">
+          <a:bodyPr spcFirstLastPara="1" wrap="square" lIns="91425" tIns="91425" rIns="91425" bIns="91425" anchor="t" anchorCtr="0">
             <a:noAutofit/>
           </a:bodyPr>
           <a:lstStyle/>
           <a:p>
-            <a:pPr indent="0" lvl="0" marL="0" rtl="0" algn="l">
+            <a:pPr marL="0" lvl="0" indent="0" algn="l" rtl="0">
               <a:spcBef>
                 <a:spcPts val="0"/>
               </a:spcBef>
@@ -970,9 +1004,6 @@
               </a:spcAft>
               <a:buNone/>
             </a:pPr>
-            <a:r>
-              <a:t/>
-            </a:r>
             <a:endParaRPr/>
           </a:p>
         </p:txBody>
@@ -986,11 +1017,11 @@
 </file>
 
 <file path=ppt/slideLayouts/slideLayout1.xml><?xml version="1.0" encoding="utf-8"?>
-<p:sldLayout xmlns:a="http://schemas.openxmlformats.org/drawingml/2006/main" xmlns:r="http://schemas.openxmlformats.org/officeDocument/2006/relationships" xmlns:mc="http://schemas.openxmlformats.org/markup-compatibility/2006" xmlns:mv="urn:schemas-microsoft-com:mac:vml" xmlns:p="http://schemas.openxmlformats.org/presentationml/2006/main" xmlns:c="http://schemas.openxmlformats.org/drawingml/2006/chart" xmlns:dgm="http://schemas.openxmlformats.org/drawingml/2006/diagram" xmlns:o="urn:schemas-microsoft-com:office:office" xmlns:v="urn:schemas-microsoft-com:vml" xmlns:pvml="urn:schemas-microsoft-com:office:powerpoint" xmlns:com="http://schemas.openxmlformats.org/drawingml/2006/compatibility" xmlns:p14="http://schemas.microsoft.com/office/powerpoint/2010/main" xmlns:p15="http://schemas.microsoft.com/office/powerpoint/2012/main" xmlns:ahyp="http://schemas.microsoft.com/office/drawing/2018/hyperlinkcolor" matchingName="Title slide" type="title">
+<p:sldLayout xmlns:a="http://schemas.openxmlformats.org/drawingml/2006/main" xmlns:r="http://schemas.openxmlformats.org/officeDocument/2006/relationships" xmlns:p="http://schemas.openxmlformats.org/presentationml/2006/main" matchingName="Title slide" type="title">
   <p:cSld name="TITLE">
     <p:spTree>
       <p:nvGrpSpPr>
-        <p:cNvPr id="9" name="Shape 9"/>
+        <p:cNvPr id="1" name="Shape 9"/>
         <p:cNvGrpSpPr/>
         <p:nvPr/>
       </p:nvGrpSpPr>
@@ -1005,7 +1036,9 @@
       <p:sp>
         <p:nvSpPr>
           <p:cNvPr id="10" name="Google Shape;10;p2"/>
-          <p:cNvSpPr txBox="1"/>
+          <p:cNvSpPr txBox="1">
+            <a:spLocks noGrp="1"/>
+          </p:cNvSpPr>
           <p:nvPr>
             <p:ph type="ctrTitle"/>
           </p:nvPr>
@@ -1020,7 +1053,7 @@
           </a:prstGeom>
         </p:spPr>
         <p:txBody>
-          <a:bodyPr anchorCtr="0" anchor="b" bIns="91425" lIns="91425" spcFirstLastPara="1" rIns="91425" wrap="square" tIns="91425">
+          <a:bodyPr spcFirstLastPara="1" wrap="square" lIns="91425" tIns="91425" rIns="91425" bIns="91425" anchor="b" anchorCtr="0">
             <a:normAutofit/>
           </a:bodyPr>
           <a:lstStyle>
@@ -1124,15 +1157,19 @@
               <a:defRPr sz="5200"/>
             </a:lvl9pPr>
           </a:lstStyle>
-          <a:p/>
+          <a:p>
+            <a:endParaRPr/>
+          </a:p>
         </p:txBody>
       </p:sp>
       <p:sp>
         <p:nvSpPr>
           <p:cNvPr id="11" name="Google Shape;11;p2"/>
-          <p:cNvSpPr txBox="1"/>
+          <p:cNvSpPr txBox="1">
+            <a:spLocks noGrp="1"/>
+          </p:cNvSpPr>
           <p:nvPr>
-            <p:ph idx="1" type="subTitle"/>
+            <p:ph type="subTitle" idx="1"/>
           </p:nvPr>
         </p:nvSpPr>
         <p:spPr>
@@ -1145,7 +1182,7 @@
           </a:prstGeom>
         </p:spPr>
         <p:txBody>
-          <a:bodyPr anchorCtr="0" anchor="t" bIns="91425" lIns="91425" spcFirstLastPara="1" rIns="91425" wrap="square" tIns="91425">
+          <a:bodyPr spcFirstLastPara="1" wrap="square" lIns="91425" tIns="91425" rIns="91425" bIns="91425" anchor="t" anchorCtr="0">
             <a:normAutofit/>
           </a:bodyPr>
           <a:lstStyle>
@@ -1276,15 +1313,19 @@
               <a:defRPr sz="2800"/>
             </a:lvl9pPr>
           </a:lstStyle>
-          <a:p/>
+          <a:p>
+            <a:endParaRPr/>
+          </a:p>
         </p:txBody>
       </p:sp>
       <p:sp>
         <p:nvSpPr>
           <p:cNvPr id="12" name="Google Shape;12;p2"/>
-          <p:cNvSpPr txBox="1"/>
+          <p:cNvSpPr txBox="1">
+            <a:spLocks noGrp="1"/>
+          </p:cNvSpPr>
           <p:nvPr>
-            <p:ph idx="12" type="sldNum"/>
+            <p:ph type="sldNum" idx="12"/>
           </p:nvPr>
         </p:nvSpPr>
         <p:spPr>
@@ -1297,7 +1338,7 @@
           </a:prstGeom>
         </p:spPr>
         <p:txBody>
-          <a:bodyPr anchorCtr="0" anchor="ctr" bIns="91425" lIns="91425" spcFirstLastPara="1" rIns="91425" wrap="square" tIns="91425">
+          <a:bodyPr spcFirstLastPara="1" wrap="square" lIns="91425" tIns="91425" rIns="91425" bIns="91425" anchor="ctr" anchorCtr="0">
             <a:normAutofit/>
           </a:bodyPr>
           <a:lstStyle>
@@ -1339,7 +1380,7 @@
             </a:lvl9pPr>
           </a:lstStyle>
           <a:p>
-            <a:pPr indent="0" lvl="0" marL="0" rtl="0" algn="r">
+            <a:pPr marL="0" lvl="0" indent="0" algn="r" rtl="0">
               <a:spcBef>
                 <a:spcPts val="0"/>
               </a:spcBef>
@@ -1365,11 +1406,11 @@
 </file>
 
 <file path=ppt/slideLayouts/slideLayout10.xml><?xml version="1.0" encoding="utf-8"?>
-<p:sldLayout xmlns:a="http://schemas.openxmlformats.org/drawingml/2006/main" xmlns:r="http://schemas.openxmlformats.org/officeDocument/2006/relationships" xmlns:mc="http://schemas.openxmlformats.org/markup-compatibility/2006" xmlns:mv="urn:schemas-microsoft-com:mac:vml" xmlns:p="http://schemas.openxmlformats.org/presentationml/2006/main" xmlns:c="http://schemas.openxmlformats.org/drawingml/2006/chart" xmlns:dgm="http://schemas.openxmlformats.org/drawingml/2006/diagram" xmlns:o="urn:schemas-microsoft-com:office:office" xmlns:v="urn:schemas-microsoft-com:vml" xmlns:pvml="urn:schemas-microsoft-com:office:powerpoint" xmlns:com="http://schemas.openxmlformats.org/drawingml/2006/compatibility" xmlns:p14="http://schemas.microsoft.com/office/powerpoint/2010/main" xmlns:p15="http://schemas.microsoft.com/office/powerpoint/2012/main" xmlns:ahyp="http://schemas.microsoft.com/office/drawing/2018/hyperlinkcolor" matchingName="Big number">
+<p:sldLayout xmlns:a="http://schemas.openxmlformats.org/drawingml/2006/main" xmlns:r="http://schemas.openxmlformats.org/officeDocument/2006/relationships" xmlns:p="http://schemas.openxmlformats.org/presentationml/2006/main" matchingName="Big number">
   <p:cSld name="BIG_NUMBER">
     <p:spTree>
       <p:nvGrpSpPr>
-        <p:cNvPr id="44" name="Shape 44"/>
+        <p:cNvPr id="1" name="Shape 44"/>
         <p:cNvGrpSpPr/>
         <p:nvPr/>
       </p:nvGrpSpPr>
@@ -1384,9 +1425,11 @@
       <p:sp>
         <p:nvSpPr>
           <p:cNvPr id="45" name="Google Shape;45;p11"/>
-          <p:cNvSpPr txBox="1"/>
+          <p:cNvSpPr txBox="1">
+            <a:spLocks noGrp="1"/>
+          </p:cNvSpPr>
           <p:nvPr>
-            <p:ph hasCustomPrompt="1" type="title"/>
+            <p:ph type="title" hasCustomPrompt="1"/>
           </p:nvPr>
         </p:nvSpPr>
         <p:spPr>
@@ -1399,7 +1442,7 @@
           </a:prstGeom>
         </p:spPr>
         <p:txBody>
-          <a:bodyPr anchorCtr="0" anchor="b" bIns="91425" lIns="91425" spcFirstLastPara="1" rIns="91425" wrap="square" tIns="91425">
+          <a:bodyPr spcFirstLastPara="1" wrap="square" lIns="91425" tIns="91425" rIns="91425" bIns="91425" anchor="b" anchorCtr="0">
             <a:normAutofit/>
           </a:bodyPr>
           <a:lstStyle>
@@ -1513,9 +1556,11 @@
       <p:sp>
         <p:nvSpPr>
           <p:cNvPr id="46" name="Google Shape;46;p11"/>
-          <p:cNvSpPr txBox="1"/>
+          <p:cNvSpPr txBox="1">
+            <a:spLocks noGrp="1"/>
+          </p:cNvSpPr>
           <p:nvPr>
-            <p:ph idx="1" type="body"/>
+            <p:ph type="body" idx="1"/>
           </p:nvPr>
         </p:nvSpPr>
         <p:spPr>
@@ -1528,11 +1573,11 @@
           </a:prstGeom>
         </p:spPr>
         <p:txBody>
-          <a:bodyPr anchorCtr="0" anchor="t" bIns="91425" lIns="91425" spcFirstLastPara="1" rIns="91425" wrap="square" tIns="91425">
+          <a:bodyPr spcFirstLastPara="1" wrap="square" lIns="91425" tIns="91425" rIns="91425" bIns="91425" anchor="t" anchorCtr="0">
             <a:normAutofit/>
           </a:bodyPr>
           <a:lstStyle>
-            <a:lvl1pPr indent="-342900" lvl="0" marL="457200" algn="ctr">
+            <a:lvl1pPr marL="457200" lvl="0" indent="-342900" algn="ctr">
               <a:spcBef>
                 <a:spcPts val="0"/>
               </a:spcBef>
@@ -1543,7 +1588,7 @@
               <a:buChar char="●"/>
               <a:defRPr/>
             </a:lvl1pPr>
-            <a:lvl2pPr indent="-317500" lvl="1" marL="914400" algn="ctr">
+            <a:lvl2pPr marL="914400" lvl="1" indent="-317500" algn="ctr">
               <a:spcBef>
                 <a:spcPts val="0"/>
               </a:spcBef>
@@ -1554,7 +1599,7 @@
               <a:buChar char="○"/>
               <a:defRPr/>
             </a:lvl2pPr>
-            <a:lvl3pPr indent="-317500" lvl="2" marL="1371600" algn="ctr">
+            <a:lvl3pPr marL="1371600" lvl="2" indent="-317500" algn="ctr">
               <a:spcBef>
                 <a:spcPts val="0"/>
               </a:spcBef>
@@ -1565,7 +1610,7 @@
               <a:buChar char="■"/>
               <a:defRPr/>
             </a:lvl3pPr>
-            <a:lvl4pPr indent="-317500" lvl="3" marL="1828800" algn="ctr">
+            <a:lvl4pPr marL="1828800" lvl="3" indent="-317500" algn="ctr">
               <a:spcBef>
                 <a:spcPts val="0"/>
               </a:spcBef>
@@ -1576,7 +1621,7 @@
               <a:buChar char="●"/>
               <a:defRPr/>
             </a:lvl4pPr>
-            <a:lvl5pPr indent="-317500" lvl="4" marL="2286000" algn="ctr">
+            <a:lvl5pPr marL="2286000" lvl="4" indent="-317500" algn="ctr">
               <a:spcBef>
                 <a:spcPts val="0"/>
               </a:spcBef>
@@ -1587,7 +1632,7 @@
               <a:buChar char="○"/>
               <a:defRPr/>
             </a:lvl5pPr>
-            <a:lvl6pPr indent="-317500" lvl="5" marL="2743200" algn="ctr">
+            <a:lvl6pPr marL="2743200" lvl="5" indent="-317500" algn="ctr">
               <a:spcBef>
                 <a:spcPts val="0"/>
               </a:spcBef>
@@ -1598,7 +1643,7 @@
               <a:buChar char="■"/>
               <a:defRPr/>
             </a:lvl6pPr>
-            <a:lvl7pPr indent="-317500" lvl="6" marL="3200400" algn="ctr">
+            <a:lvl7pPr marL="3200400" lvl="6" indent="-317500" algn="ctr">
               <a:spcBef>
                 <a:spcPts val="0"/>
               </a:spcBef>
@@ -1609,7 +1654,7 @@
               <a:buChar char="●"/>
               <a:defRPr/>
             </a:lvl7pPr>
-            <a:lvl8pPr indent="-317500" lvl="7" marL="3657600" algn="ctr">
+            <a:lvl8pPr marL="3657600" lvl="7" indent="-317500" algn="ctr">
               <a:spcBef>
                 <a:spcPts val="0"/>
               </a:spcBef>
@@ -1620,7 +1665,7 @@
               <a:buChar char="○"/>
               <a:defRPr/>
             </a:lvl8pPr>
-            <a:lvl9pPr indent="-317500" lvl="8" marL="4114800" algn="ctr">
+            <a:lvl9pPr marL="4114800" lvl="8" indent="-317500" algn="ctr">
               <a:spcBef>
                 <a:spcPts val="0"/>
               </a:spcBef>
@@ -1632,15 +1677,19 @@
               <a:defRPr/>
             </a:lvl9pPr>
           </a:lstStyle>
-          <a:p/>
+          <a:p>
+            <a:endParaRPr/>
+          </a:p>
         </p:txBody>
       </p:sp>
       <p:sp>
         <p:nvSpPr>
           <p:cNvPr id="47" name="Google Shape;47;p11"/>
-          <p:cNvSpPr txBox="1"/>
+          <p:cNvSpPr txBox="1">
+            <a:spLocks noGrp="1"/>
+          </p:cNvSpPr>
           <p:nvPr>
-            <p:ph idx="12" type="sldNum"/>
+            <p:ph type="sldNum" idx="12"/>
           </p:nvPr>
         </p:nvSpPr>
         <p:spPr>
@@ -1653,7 +1702,7 @@
           </a:prstGeom>
         </p:spPr>
         <p:txBody>
-          <a:bodyPr anchorCtr="0" anchor="ctr" bIns="91425" lIns="91425" spcFirstLastPara="1" rIns="91425" wrap="square" tIns="91425">
+          <a:bodyPr spcFirstLastPara="1" wrap="square" lIns="91425" tIns="91425" rIns="91425" bIns="91425" anchor="ctr" anchorCtr="0">
             <a:normAutofit/>
           </a:bodyPr>
           <a:lstStyle>
@@ -1695,7 +1744,7 @@
             </a:lvl9pPr>
           </a:lstStyle>
           <a:p>
-            <a:pPr indent="0" lvl="0" marL="0" rtl="0" algn="r">
+            <a:pPr marL="0" lvl="0" indent="0" algn="r" rtl="0">
               <a:spcBef>
                 <a:spcPts val="0"/>
               </a:spcBef>
@@ -1721,11 +1770,11 @@
 </file>
 
 <file path=ppt/slideLayouts/slideLayout11.xml><?xml version="1.0" encoding="utf-8"?>
-<p:sldLayout xmlns:a="http://schemas.openxmlformats.org/drawingml/2006/main" xmlns:r="http://schemas.openxmlformats.org/officeDocument/2006/relationships" xmlns:mc="http://schemas.openxmlformats.org/markup-compatibility/2006" xmlns:mv="urn:schemas-microsoft-com:mac:vml" xmlns:p="http://schemas.openxmlformats.org/presentationml/2006/main" xmlns:c="http://schemas.openxmlformats.org/drawingml/2006/chart" xmlns:dgm="http://schemas.openxmlformats.org/drawingml/2006/diagram" xmlns:o="urn:schemas-microsoft-com:office:office" xmlns:v="urn:schemas-microsoft-com:vml" xmlns:pvml="urn:schemas-microsoft-com:office:powerpoint" xmlns:com="http://schemas.openxmlformats.org/drawingml/2006/compatibility" xmlns:p14="http://schemas.microsoft.com/office/powerpoint/2010/main" xmlns:p15="http://schemas.microsoft.com/office/powerpoint/2012/main" xmlns:ahyp="http://schemas.microsoft.com/office/drawing/2018/hyperlinkcolor" matchingName="Blank" type="blank">
+<p:sldLayout xmlns:a="http://schemas.openxmlformats.org/drawingml/2006/main" xmlns:r="http://schemas.openxmlformats.org/officeDocument/2006/relationships" xmlns:p="http://schemas.openxmlformats.org/presentationml/2006/main" matchingName="Blank" type="blank">
   <p:cSld name="BLANK">
     <p:spTree>
       <p:nvGrpSpPr>
-        <p:cNvPr id="48" name="Shape 48"/>
+        <p:cNvPr id="1" name="Shape 48"/>
         <p:cNvGrpSpPr/>
         <p:nvPr/>
       </p:nvGrpSpPr>
@@ -1740,9 +1789,11 @@
       <p:sp>
         <p:nvSpPr>
           <p:cNvPr id="49" name="Google Shape;49;p12"/>
-          <p:cNvSpPr txBox="1"/>
+          <p:cNvSpPr txBox="1">
+            <a:spLocks noGrp="1"/>
+          </p:cNvSpPr>
           <p:nvPr>
-            <p:ph idx="12" type="sldNum"/>
+            <p:ph type="sldNum" idx="12"/>
           </p:nvPr>
         </p:nvSpPr>
         <p:spPr>
@@ -1755,7 +1806,7 @@
           </a:prstGeom>
         </p:spPr>
         <p:txBody>
-          <a:bodyPr anchorCtr="0" anchor="ctr" bIns="91425" lIns="91425" spcFirstLastPara="1" rIns="91425" wrap="square" tIns="91425">
+          <a:bodyPr spcFirstLastPara="1" wrap="square" lIns="91425" tIns="91425" rIns="91425" bIns="91425" anchor="ctr" anchorCtr="0">
             <a:normAutofit/>
           </a:bodyPr>
           <a:lstStyle>
@@ -1797,7 +1848,7 @@
             </a:lvl9pPr>
           </a:lstStyle>
           <a:p>
-            <a:pPr indent="0" lvl="0" marL="0" rtl="0" algn="r">
+            <a:pPr marL="0" lvl="0" indent="0" algn="r" rtl="0">
               <a:spcBef>
                 <a:spcPts val="0"/>
               </a:spcBef>
@@ -1823,11 +1874,11 @@
 </file>
 
 <file path=ppt/slideLayouts/slideLayout2.xml><?xml version="1.0" encoding="utf-8"?>
-<p:sldLayout xmlns:a="http://schemas.openxmlformats.org/drawingml/2006/main" xmlns:r="http://schemas.openxmlformats.org/officeDocument/2006/relationships" xmlns:mc="http://schemas.openxmlformats.org/markup-compatibility/2006" xmlns:mv="urn:schemas-microsoft-com:mac:vml" xmlns:p="http://schemas.openxmlformats.org/presentationml/2006/main" xmlns:c="http://schemas.openxmlformats.org/drawingml/2006/chart" xmlns:dgm="http://schemas.openxmlformats.org/drawingml/2006/diagram" xmlns:o="urn:schemas-microsoft-com:office:office" xmlns:v="urn:schemas-microsoft-com:vml" xmlns:pvml="urn:schemas-microsoft-com:office:powerpoint" xmlns:com="http://schemas.openxmlformats.org/drawingml/2006/compatibility" xmlns:p14="http://schemas.microsoft.com/office/powerpoint/2010/main" xmlns:p15="http://schemas.microsoft.com/office/powerpoint/2012/main" xmlns:ahyp="http://schemas.microsoft.com/office/drawing/2018/hyperlinkcolor" matchingName="Section header" type="secHead">
+<p:sldLayout xmlns:a="http://schemas.openxmlformats.org/drawingml/2006/main" xmlns:r="http://schemas.openxmlformats.org/officeDocument/2006/relationships" xmlns:p="http://schemas.openxmlformats.org/presentationml/2006/main" matchingName="Section header" type="secHead">
   <p:cSld name="SECTION_HEADER">
     <p:spTree>
       <p:nvGrpSpPr>
-        <p:cNvPr id="13" name="Shape 13"/>
+        <p:cNvPr id="1" name="Shape 13"/>
         <p:cNvGrpSpPr/>
         <p:nvPr/>
       </p:nvGrpSpPr>
@@ -1842,7 +1893,9 @@
       <p:sp>
         <p:nvSpPr>
           <p:cNvPr id="14" name="Google Shape;14;p3"/>
-          <p:cNvSpPr txBox="1"/>
+          <p:cNvSpPr txBox="1">
+            <a:spLocks noGrp="1"/>
+          </p:cNvSpPr>
           <p:nvPr>
             <p:ph type="title"/>
           </p:nvPr>
@@ -1857,7 +1910,7 @@
           </a:prstGeom>
         </p:spPr>
         <p:txBody>
-          <a:bodyPr anchorCtr="0" anchor="ctr" bIns="91425" lIns="91425" spcFirstLastPara="1" rIns="91425" wrap="square" tIns="91425">
+          <a:bodyPr spcFirstLastPara="1" wrap="square" lIns="91425" tIns="91425" rIns="91425" bIns="91425" anchor="ctr" anchorCtr="0">
             <a:normAutofit/>
           </a:bodyPr>
           <a:lstStyle>
@@ -1961,15 +2014,19 @@
               <a:defRPr sz="3600"/>
             </a:lvl9pPr>
           </a:lstStyle>
-          <a:p/>
+          <a:p>
+            <a:endParaRPr/>
+          </a:p>
         </p:txBody>
       </p:sp>
       <p:sp>
         <p:nvSpPr>
           <p:cNvPr id="15" name="Google Shape;15;p3"/>
-          <p:cNvSpPr txBox="1"/>
+          <p:cNvSpPr txBox="1">
+            <a:spLocks noGrp="1"/>
+          </p:cNvSpPr>
           <p:nvPr>
-            <p:ph idx="12" type="sldNum"/>
+            <p:ph type="sldNum" idx="12"/>
           </p:nvPr>
         </p:nvSpPr>
         <p:spPr>
@@ -1982,7 +2039,7 @@
           </a:prstGeom>
         </p:spPr>
         <p:txBody>
-          <a:bodyPr anchorCtr="0" anchor="ctr" bIns="91425" lIns="91425" spcFirstLastPara="1" rIns="91425" wrap="square" tIns="91425">
+          <a:bodyPr spcFirstLastPara="1" wrap="square" lIns="91425" tIns="91425" rIns="91425" bIns="91425" anchor="ctr" anchorCtr="0">
             <a:normAutofit/>
           </a:bodyPr>
           <a:lstStyle>
@@ -2024,7 +2081,7 @@
             </a:lvl9pPr>
           </a:lstStyle>
           <a:p>
-            <a:pPr indent="0" lvl="0" marL="0" rtl="0" algn="r">
+            <a:pPr marL="0" lvl="0" indent="0" algn="r" rtl="0">
               <a:spcBef>
                 <a:spcPts val="0"/>
               </a:spcBef>
@@ -2050,11 +2107,11 @@
 </file>
 
 <file path=ppt/slideLayouts/slideLayout3.xml><?xml version="1.0" encoding="utf-8"?>
-<p:sldLayout xmlns:a="http://schemas.openxmlformats.org/drawingml/2006/main" xmlns:r="http://schemas.openxmlformats.org/officeDocument/2006/relationships" xmlns:mc="http://schemas.openxmlformats.org/markup-compatibility/2006" xmlns:mv="urn:schemas-microsoft-com:mac:vml" xmlns:p="http://schemas.openxmlformats.org/presentationml/2006/main" xmlns:c="http://schemas.openxmlformats.org/drawingml/2006/chart" xmlns:dgm="http://schemas.openxmlformats.org/drawingml/2006/diagram" xmlns:o="urn:schemas-microsoft-com:office:office" xmlns:v="urn:schemas-microsoft-com:vml" xmlns:pvml="urn:schemas-microsoft-com:office:powerpoint" xmlns:com="http://schemas.openxmlformats.org/drawingml/2006/compatibility" xmlns:p14="http://schemas.microsoft.com/office/powerpoint/2010/main" xmlns:p15="http://schemas.microsoft.com/office/powerpoint/2012/main" xmlns:ahyp="http://schemas.microsoft.com/office/drawing/2018/hyperlinkcolor" matchingName="Title and body" type="tx">
+<p:sldLayout xmlns:a="http://schemas.openxmlformats.org/drawingml/2006/main" xmlns:r="http://schemas.openxmlformats.org/officeDocument/2006/relationships" xmlns:p="http://schemas.openxmlformats.org/presentationml/2006/main" matchingName="Title and body" type="tx">
   <p:cSld name="TITLE_AND_BODY">
     <p:spTree>
       <p:nvGrpSpPr>
-        <p:cNvPr id="16" name="Shape 16"/>
+        <p:cNvPr id="1" name="Shape 16"/>
         <p:cNvGrpSpPr/>
         <p:nvPr/>
       </p:nvGrpSpPr>
@@ -2069,7 +2126,9 @@
       <p:sp>
         <p:nvSpPr>
           <p:cNvPr id="17" name="Google Shape;17;p4"/>
-          <p:cNvSpPr txBox="1"/>
+          <p:cNvSpPr txBox="1">
+            <a:spLocks noGrp="1"/>
+          </p:cNvSpPr>
           <p:nvPr>
             <p:ph type="title"/>
           </p:nvPr>
@@ -2084,7 +2143,7 @@
           </a:prstGeom>
         </p:spPr>
         <p:txBody>
-          <a:bodyPr anchorCtr="0" anchor="t" bIns="91425" lIns="91425" spcFirstLastPara="1" rIns="91425" wrap="square" tIns="91425">
+          <a:bodyPr spcFirstLastPara="1" wrap="square" lIns="91425" tIns="91425" rIns="91425" bIns="91425" anchor="t" anchorCtr="0">
             <a:normAutofit/>
           </a:bodyPr>
           <a:lstStyle>
@@ -2188,15 +2247,19 @@
               <a:defRPr/>
             </a:lvl9pPr>
           </a:lstStyle>
-          <a:p/>
+          <a:p>
+            <a:endParaRPr/>
+          </a:p>
         </p:txBody>
       </p:sp>
       <p:sp>
         <p:nvSpPr>
           <p:cNvPr id="18" name="Google Shape;18;p4"/>
-          <p:cNvSpPr txBox="1"/>
+          <p:cNvSpPr txBox="1">
+            <a:spLocks noGrp="1"/>
+          </p:cNvSpPr>
           <p:nvPr>
-            <p:ph idx="1" type="body"/>
+            <p:ph type="body" idx="1"/>
           </p:nvPr>
         </p:nvSpPr>
         <p:spPr>
@@ -2209,11 +2272,11 @@
           </a:prstGeom>
         </p:spPr>
         <p:txBody>
-          <a:bodyPr anchorCtr="0" anchor="t" bIns="91425" lIns="91425" spcFirstLastPara="1" rIns="91425" wrap="square" tIns="91425">
+          <a:bodyPr spcFirstLastPara="1" wrap="square" lIns="91425" tIns="91425" rIns="91425" bIns="91425" anchor="t" anchorCtr="0">
             <a:normAutofit/>
           </a:bodyPr>
           <a:lstStyle>
-            <a:lvl1pPr indent="-342900" lvl="0" marL="457200">
+            <a:lvl1pPr marL="457200" lvl="0" indent="-342900">
               <a:spcBef>
                 <a:spcPts val="0"/>
               </a:spcBef>
@@ -2224,7 +2287,7 @@
               <a:buChar char="●"/>
               <a:defRPr/>
             </a:lvl1pPr>
-            <a:lvl2pPr indent="-317500" lvl="1" marL="914400">
+            <a:lvl2pPr marL="914400" lvl="1" indent="-317500">
               <a:spcBef>
                 <a:spcPts val="0"/>
               </a:spcBef>
@@ -2235,7 +2298,7 @@
               <a:buChar char="○"/>
               <a:defRPr/>
             </a:lvl2pPr>
-            <a:lvl3pPr indent="-317500" lvl="2" marL="1371600">
+            <a:lvl3pPr marL="1371600" lvl="2" indent="-317500">
               <a:spcBef>
                 <a:spcPts val="0"/>
               </a:spcBef>
@@ -2246,7 +2309,7 @@
               <a:buChar char="■"/>
               <a:defRPr/>
             </a:lvl3pPr>
-            <a:lvl4pPr indent="-317500" lvl="3" marL="1828800">
+            <a:lvl4pPr marL="1828800" lvl="3" indent="-317500">
               <a:spcBef>
                 <a:spcPts val="0"/>
               </a:spcBef>
@@ -2257,7 +2320,7 @@
               <a:buChar char="●"/>
               <a:defRPr/>
             </a:lvl4pPr>
-            <a:lvl5pPr indent="-317500" lvl="4" marL="2286000">
+            <a:lvl5pPr marL="2286000" lvl="4" indent="-317500">
               <a:spcBef>
                 <a:spcPts val="0"/>
               </a:spcBef>
@@ -2268,7 +2331,7 @@
               <a:buChar char="○"/>
               <a:defRPr/>
             </a:lvl5pPr>
-            <a:lvl6pPr indent="-317500" lvl="5" marL="2743200">
+            <a:lvl6pPr marL="2743200" lvl="5" indent="-317500">
               <a:spcBef>
                 <a:spcPts val="0"/>
               </a:spcBef>
@@ -2279,7 +2342,7 @@
               <a:buChar char="■"/>
               <a:defRPr/>
             </a:lvl6pPr>
-            <a:lvl7pPr indent="-317500" lvl="6" marL="3200400">
+            <a:lvl7pPr marL="3200400" lvl="6" indent="-317500">
               <a:spcBef>
                 <a:spcPts val="0"/>
               </a:spcBef>
@@ -2290,7 +2353,7 @@
               <a:buChar char="●"/>
               <a:defRPr/>
             </a:lvl7pPr>
-            <a:lvl8pPr indent="-317500" lvl="7" marL="3657600">
+            <a:lvl8pPr marL="3657600" lvl="7" indent="-317500">
               <a:spcBef>
                 <a:spcPts val="0"/>
               </a:spcBef>
@@ -2301,7 +2364,7 @@
               <a:buChar char="○"/>
               <a:defRPr/>
             </a:lvl8pPr>
-            <a:lvl9pPr indent="-317500" lvl="8" marL="4114800">
+            <a:lvl9pPr marL="4114800" lvl="8" indent="-317500">
               <a:spcBef>
                 <a:spcPts val="0"/>
               </a:spcBef>
@@ -2313,15 +2376,19 @@
               <a:defRPr/>
             </a:lvl9pPr>
           </a:lstStyle>
-          <a:p/>
+          <a:p>
+            <a:endParaRPr/>
+          </a:p>
         </p:txBody>
       </p:sp>
       <p:sp>
         <p:nvSpPr>
           <p:cNvPr id="19" name="Google Shape;19;p4"/>
-          <p:cNvSpPr txBox="1"/>
+          <p:cNvSpPr txBox="1">
+            <a:spLocks noGrp="1"/>
+          </p:cNvSpPr>
           <p:nvPr>
-            <p:ph idx="12" type="sldNum"/>
+            <p:ph type="sldNum" idx="12"/>
           </p:nvPr>
         </p:nvSpPr>
         <p:spPr>
@@ -2334,7 +2401,7 @@
           </a:prstGeom>
         </p:spPr>
         <p:txBody>
-          <a:bodyPr anchorCtr="0" anchor="ctr" bIns="91425" lIns="91425" spcFirstLastPara="1" rIns="91425" wrap="square" tIns="91425">
+          <a:bodyPr spcFirstLastPara="1" wrap="square" lIns="91425" tIns="91425" rIns="91425" bIns="91425" anchor="ctr" anchorCtr="0">
             <a:normAutofit/>
           </a:bodyPr>
           <a:lstStyle>
@@ -2376,7 +2443,7 @@
             </a:lvl9pPr>
           </a:lstStyle>
           <a:p>
-            <a:pPr indent="0" lvl="0" marL="0" rtl="0" algn="r">
+            <a:pPr marL="0" lvl="0" indent="0" algn="r" rtl="0">
               <a:spcBef>
                 <a:spcPts val="0"/>
               </a:spcBef>
@@ -2402,11 +2469,11 @@
 </file>
 
 <file path=ppt/slideLayouts/slideLayout4.xml><?xml version="1.0" encoding="utf-8"?>
-<p:sldLayout xmlns:a="http://schemas.openxmlformats.org/drawingml/2006/main" xmlns:r="http://schemas.openxmlformats.org/officeDocument/2006/relationships" xmlns:mc="http://schemas.openxmlformats.org/markup-compatibility/2006" xmlns:mv="urn:schemas-microsoft-com:mac:vml" xmlns:p="http://schemas.openxmlformats.org/presentationml/2006/main" xmlns:c="http://schemas.openxmlformats.org/drawingml/2006/chart" xmlns:dgm="http://schemas.openxmlformats.org/drawingml/2006/diagram" xmlns:o="urn:schemas-microsoft-com:office:office" xmlns:v="urn:schemas-microsoft-com:vml" xmlns:pvml="urn:schemas-microsoft-com:office:powerpoint" xmlns:com="http://schemas.openxmlformats.org/drawingml/2006/compatibility" xmlns:p14="http://schemas.microsoft.com/office/powerpoint/2010/main" xmlns:p15="http://schemas.microsoft.com/office/powerpoint/2012/main" xmlns:ahyp="http://schemas.microsoft.com/office/drawing/2018/hyperlinkcolor" matchingName="Title and two columns" type="twoColTx">
+<p:sldLayout xmlns:a="http://schemas.openxmlformats.org/drawingml/2006/main" xmlns:r="http://schemas.openxmlformats.org/officeDocument/2006/relationships" xmlns:p="http://schemas.openxmlformats.org/presentationml/2006/main" matchingName="Title and two columns" type="twoColTx">
   <p:cSld name="TITLE_AND_TWO_COLUMNS">
     <p:spTree>
       <p:nvGrpSpPr>
-        <p:cNvPr id="20" name="Shape 20"/>
+        <p:cNvPr id="1" name="Shape 20"/>
         <p:cNvGrpSpPr/>
         <p:nvPr/>
       </p:nvGrpSpPr>
@@ -2421,7 +2488,9 @@
       <p:sp>
         <p:nvSpPr>
           <p:cNvPr id="21" name="Google Shape;21;p5"/>
-          <p:cNvSpPr txBox="1"/>
+          <p:cNvSpPr txBox="1">
+            <a:spLocks noGrp="1"/>
+          </p:cNvSpPr>
           <p:nvPr>
             <p:ph type="title"/>
           </p:nvPr>
@@ -2436,7 +2505,7 @@
           </a:prstGeom>
         </p:spPr>
         <p:txBody>
-          <a:bodyPr anchorCtr="0" anchor="t" bIns="91425" lIns="91425" spcFirstLastPara="1" rIns="91425" wrap="square" tIns="91425">
+          <a:bodyPr spcFirstLastPara="1" wrap="square" lIns="91425" tIns="91425" rIns="91425" bIns="91425" anchor="t" anchorCtr="0">
             <a:normAutofit/>
           </a:bodyPr>
           <a:lstStyle>
@@ -2540,15 +2609,19 @@
               <a:defRPr/>
             </a:lvl9pPr>
           </a:lstStyle>
-          <a:p/>
+          <a:p>
+            <a:endParaRPr/>
+          </a:p>
         </p:txBody>
       </p:sp>
       <p:sp>
         <p:nvSpPr>
           <p:cNvPr id="22" name="Google Shape;22;p5"/>
-          <p:cNvSpPr txBox="1"/>
+          <p:cNvSpPr txBox="1">
+            <a:spLocks noGrp="1"/>
+          </p:cNvSpPr>
           <p:nvPr>
-            <p:ph idx="1" type="body"/>
+            <p:ph type="body" idx="1"/>
           </p:nvPr>
         </p:nvSpPr>
         <p:spPr>
@@ -2561,11 +2634,11 @@
           </a:prstGeom>
         </p:spPr>
         <p:txBody>
-          <a:bodyPr anchorCtr="0" anchor="t" bIns="91425" lIns="91425" spcFirstLastPara="1" rIns="91425" wrap="square" tIns="91425">
+          <a:bodyPr spcFirstLastPara="1" wrap="square" lIns="91425" tIns="91425" rIns="91425" bIns="91425" anchor="t" anchorCtr="0">
             <a:normAutofit/>
           </a:bodyPr>
           <a:lstStyle>
-            <a:lvl1pPr indent="-317500" lvl="0" marL="457200">
+            <a:lvl1pPr marL="457200" lvl="0" indent="-317500">
               <a:spcBef>
                 <a:spcPts val="0"/>
               </a:spcBef>
@@ -2576,7 +2649,7 @@
               <a:buChar char="●"/>
               <a:defRPr sz="1400"/>
             </a:lvl1pPr>
-            <a:lvl2pPr indent="-304800" lvl="1" marL="914400">
+            <a:lvl2pPr marL="914400" lvl="1" indent="-304800">
               <a:spcBef>
                 <a:spcPts val="0"/>
               </a:spcBef>
@@ -2587,7 +2660,7 @@
               <a:buChar char="○"/>
               <a:defRPr sz="1200"/>
             </a:lvl2pPr>
-            <a:lvl3pPr indent="-304800" lvl="2" marL="1371600">
+            <a:lvl3pPr marL="1371600" lvl="2" indent="-304800">
               <a:spcBef>
                 <a:spcPts val="0"/>
               </a:spcBef>
@@ -2598,7 +2671,7 @@
               <a:buChar char="■"/>
               <a:defRPr sz="1200"/>
             </a:lvl3pPr>
-            <a:lvl4pPr indent="-304800" lvl="3" marL="1828800">
+            <a:lvl4pPr marL="1828800" lvl="3" indent="-304800">
               <a:spcBef>
                 <a:spcPts val="0"/>
               </a:spcBef>
@@ -2609,7 +2682,7 @@
               <a:buChar char="●"/>
               <a:defRPr sz="1200"/>
             </a:lvl4pPr>
-            <a:lvl5pPr indent="-304800" lvl="4" marL="2286000">
+            <a:lvl5pPr marL="2286000" lvl="4" indent="-304800">
               <a:spcBef>
                 <a:spcPts val="0"/>
               </a:spcBef>
@@ -2620,7 +2693,7 @@
               <a:buChar char="○"/>
               <a:defRPr sz="1200"/>
             </a:lvl5pPr>
-            <a:lvl6pPr indent="-304800" lvl="5" marL="2743200">
+            <a:lvl6pPr marL="2743200" lvl="5" indent="-304800">
               <a:spcBef>
                 <a:spcPts val="0"/>
               </a:spcBef>
@@ -2631,7 +2704,7 @@
               <a:buChar char="■"/>
               <a:defRPr sz="1200"/>
             </a:lvl6pPr>
-            <a:lvl7pPr indent="-304800" lvl="6" marL="3200400">
+            <a:lvl7pPr marL="3200400" lvl="6" indent="-304800">
               <a:spcBef>
                 <a:spcPts val="0"/>
               </a:spcBef>
@@ -2642,7 +2715,7 @@
               <a:buChar char="●"/>
               <a:defRPr sz="1200"/>
             </a:lvl7pPr>
-            <a:lvl8pPr indent="-304800" lvl="7" marL="3657600">
+            <a:lvl8pPr marL="3657600" lvl="7" indent="-304800">
               <a:spcBef>
                 <a:spcPts val="0"/>
               </a:spcBef>
@@ -2653,7 +2726,7 @@
               <a:buChar char="○"/>
               <a:defRPr sz="1200"/>
             </a:lvl8pPr>
-            <a:lvl9pPr indent="-304800" lvl="8" marL="4114800">
+            <a:lvl9pPr marL="4114800" lvl="8" indent="-304800">
               <a:spcBef>
                 <a:spcPts val="0"/>
               </a:spcBef>
@@ -2665,15 +2738,19 @@
               <a:defRPr sz="1200"/>
             </a:lvl9pPr>
           </a:lstStyle>
-          <a:p/>
+          <a:p>
+            <a:endParaRPr/>
+          </a:p>
         </p:txBody>
       </p:sp>
       <p:sp>
         <p:nvSpPr>
           <p:cNvPr id="23" name="Google Shape;23;p5"/>
-          <p:cNvSpPr txBox="1"/>
+          <p:cNvSpPr txBox="1">
+            <a:spLocks noGrp="1"/>
+          </p:cNvSpPr>
           <p:nvPr>
-            <p:ph idx="2" type="body"/>
+            <p:ph type="body" idx="2"/>
           </p:nvPr>
         </p:nvSpPr>
         <p:spPr>
@@ -2686,11 +2763,11 @@
           </a:prstGeom>
         </p:spPr>
         <p:txBody>
-          <a:bodyPr anchorCtr="0" anchor="t" bIns="91425" lIns="91425" spcFirstLastPara="1" rIns="91425" wrap="square" tIns="91425">
+          <a:bodyPr spcFirstLastPara="1" wrap="square" lIns="91425" tIns="91425" rIns="91425" bIns="91425" anchor="t" anchorCtr="0">
             <a:normAutofit/>
           </a:bodyPr>
           <a:lstStyle>
-            <a:lvl1pPr indent="-317500" lvl="0" marL="457200">
+            <a:lvl1pPr marL="457200" lvl="0" indent="-317500">
               <a:spcBef>
                 <a:spcPts val="0"/>
               </a:spcBef>
@@ -2701,7 +2778,7 @@
               <a:buChar char="●"/>
               <a:defRPr sz="1400"/>
             </a:lvl1pPr>
-            <a:lvl2pPr indent="-304800" lvl="1" marL="914400">
+            <a:lvl2pPr marL="914400" lvl="1" indent="-304800">
               <a:spcBef>
                 <a:spcPts val="0"/>
               </a:spcBef>
@@ -2712,7 +2789,7 @@
               <a:buChar char="○"/>
               <a:defRPr sz="1200"/>
             </a:lvl2pPr>
-            <a:lvl3pPr indent="-304800" lvl="2" marL="1371600">
+            <a:lvl3pPr marL="1371600" lvl="2" indent="-304800">
               <a:spcBef>
                 <a:spcPts val="0"/>
               </a:spcBef>
@@ -2723,7 +2800,7 @@
               <a:buChar char="■"/>
               <a:defRPr sz="1200"/>
             </a:lvl3pPr>
-            <a:lvl4pPr indent="-304800" lvl="3" marL="1828800">
+            <a:lvl4pPr marL="1828800" lvl="3" indent="-304800">
               <a:spcBef>
                 <a:spcPts val="0"/>
               </a:spcBef>
@@ -2734,7 +2811,7 @@
               <a:buChar char="●"/>
               <a:defRPr sz="1200"/>
             </a:lvl4pPr>
-            <a:lvl5pPr indent="-304800" lvl="4" marL="2286000">
+            <a:lvl5pPr marL="2286000" lvl="4" indent="-304800">
               <a:spcBef>
                 <a:spcPts val="0"/>
               </a:spcBef>
@@ -2745,7 +2822,7 @@
               <a:buChar char="○"/>
               <a:defRPr sz="1200"/>
             </a:lvl5pPr>
-            <a:lvl6pPr indent="-304800" lvl="5" marL="2743200">
+            <a:lvl6pPr marL="2743200" lvl="5" indent="-304800">
               <a:spcBef>
                 <a:spcPts val="0"/>
               </a:spcBef>
@@ -2756,7 +2833,7 @@
               <a:buChar char="■"/>
               <a:defRPr sz="1200"/>
             </a:lvl6pPr>
-            <a:lvl7pPr indent="-304800" lvl="6" marL="3200400">
+            <a:lvl7pPr marL="3200400" lvl="6" indent="-304800">
               <a:spcBef>
                 <a:spcPts val="0"/>
               </a:spcBef>
@@ -2767,7 +2844,7 @@
               <a:buChar char="●"/>
               <a:defRPr sz="1200"/>
             </a:lvl7pPr>
-            <a:lvl8pPr indent="-304800" lvl="7" marL="3657600">
+            <a:lvl8pPr marL="3657600" lvl="7" indent="-304800">
               <a:spcBef>
                 <a:spcPts val="0"/>
               </a:spcBef>
@@ -2778,7 +2855,7 @@
               <a:buChar char="○"/>
               <a:defRPr sz="1200"/>
             </a:lvl8pPr>
-            <a:lvl9pPr indent="-304800" lvl="8" marL="4114800">
+            <a:lvl9pPr marL="4114800" lvl="8" indent="-304800">
               <a:spcBef>
                 <a:spcPts val="0"/>
               </a:spcBef>
@@ -2790,15 +2867,19 @@
               <a:defRPr sz="1200"/>
             </a:lvl9pPr>
           </a:lstStyle>
-          <a:p/>
+          <a:p>
+            <a:endParaRPr/>
+          </a:p>
         </p:txBody>
       </p:sp>
       <p:sp>
         <p:nvSpPr>
           <p:cNvPr id="24" name="Google Shape;24;p5"/>
-          <p:cNvSpPr txBox="1"/>
+          <p:cNvSpPr txBox="1">
+            <a:spLocks noGrp="1"/>
+          </p:cNvSpPr>
           <p:nvPr>
-            <p:ph idx="12" type="sldNum"/>
+            <p:ph type="sldNum" idx="12"/>
           </p:nvPr>
         </p:nvSpPr>
         <p:spPr>
@@ -2811,7 +2892,7 @@
           </a:prstGeom>
         </p:spPr>
         <p:txBody>
-          <a:bodyPr anchorCtr="0" anchor="ctr" bIns="91425" lIns="91425" spcFirstLastPara="1" rIns="91425" wrap="square" tIns="91425">
+          <a:bodyPr spcFirstLastPara="1" wrap="square" lIns="91425" tIns="91425" rIns="91425" bIns="91425" anchor="ctr" anchorCtr="0">
             <a:normAutofit/>
           </a:bodyPr>
           <a:lstStyle>
@@ -2853,7 +2934,7 @@
             </a:lvl9pPr>
           </a:lstStyle>
           <a:p>
-            <a:pPr indent="0" lvl="0" marL="0" rtl="0" algn="r">
+            <a:pPr marL="0" lvl="0" indent="0" algn="r" rtl="0">
               <a:spcBef>
                 <a:spcPts val="0"/>
               </a:spcBef>
@@ -2879,11 +2960,11 @@
 </file>
 
 <file path=ppt/slideLayouts/slideLayout5.xml><?xml version="1.0" encoding="utf-8"?>
-<p:sldLayout xmlns:a="http://schemas.openxmlformats.org/drawingml/2006/main" xmlns:r="http://schemas.openxmlformats.org/officeDocument/2006/relationships" xmlns:mc="http://schemas.openxmlformats.org/markup-compatibility/2006" xmlns:mv="urn:schemas-microsoft-com:mac:vml" xmlns:p="http://schemas.openxmlformats.org/presentationml/2006/main" xmlns:c="http://schemas.openxmlformats.org/drawingml/2006/chart" xmlns:dgm="http://schemas.openxmlformats.org/drawingml/2006/diagram" xmlns:o="urn:schemas-microsoft-com:office:office" xmlns:v="urn:schemas-microsoft-com:vml" xmlns:pvml="urn:schemas-microsoft-com:office:powerpoint" xmlns:com="http://schemas.openxmlformats.org/drawingml/2006/compatibility" xmlns:p14="http://schemas.microsoft.com/office/powerpoint/2010/main" xmlns:p15="http://schemas.microsoft.com/office/powerpoint/2012/main" xmlns:ahyp="http://schemas.microsoft.com/office/drawing/2018/hyperlinkcolor" matchingName="Title only" type="titleOnly">
+<p:sldLayout xmlns:a="http://schemas.openxmlformats.org/drawingml/2006/main" xmlns:r="http://schemas.openxmlformats.org/officeDocument/2006/relationships" xmlns:p="http://schemas.openxmlformats.org/presentationml/2006/main" matchingName="Title only" type="titleOnly">
   <p:cSld name="TITLE_ONLY">
     <p:spTree>
       <p:nvGrpSpPr>
-        <p:cNvPr id="25" name="Shape 25"/>
+        <p:cNvPr id="1" name="Shape 25"/>
         <p:cNvGrpSpPr/>
         <p:nvPr/>
       </p:nvGrpSpPr>
@@ -2898,7 +2979,9 @@
       <p:sp>
         <p:nvSpPr>
           <p:cNvPr id="26" name="Google Shape;26;p6"/>
-          <p:cNvSpPr txBox="1"/>
+          <p:cNvSpPr txBox="1">
+            <a:spLocks noGrp="1"/>
+          </p:cNvSpPr>
           <p:nvPr>
             <p:ph type="title"/>
           </p:nvPr>
@@ -2913,7 +2996,7 @@
           </a:prstGeom>
         </p:spPr>
         <p:txBody>
-          <a:bodyPr anchorCtr="0" anchor="t" bIns="91425" lIns="91425" spcFirstLastPara="1" rIns="91425" wrap="square" tIns="91425">
+          <a:bodyPr spcFirstLastPara="1" wrap="square" lIns="91425" tIns="91425" rIns="91425" bIns="91425" anchor="t" anchorCtr="0">
             <a:normAutofit/>
           </a:bodyPr>
           <a:lstStyle>
@@ -3017,15 +3100,19 @@
               <a:defRPr/>
             </a:lvl9pPr>
           </a:lstStyle>
-          <a:p/>
+          <a:p>
+            <a:endParaRPr/>
+          </a:p>
         </p:txBody>
       </p:sp>
       <p:sp>
         <p:nvSpPr>
           <p:cNvPr id="27" name="Google Shape;27;p6"/>
-          <p:cNvSpPr txBox="1"/>
+          <p:cNvSpPr txBox="1">
+            <a:spLocks noGrp="1"/>
+          </p:cNvSpPr>
           <p:nvPr>
-            <p:ph idx="12" type="sldNum"/>
+            <p:ph type="sldNum" idx="12"/>
           </p:nvPr>
         </p:nvSpPr>
         <p:spPr>
@@ -3038,7 +3125,7 @@
           </a:prstGeom>
         </p:spPr>
         <p:txBody>
-          <a:bodyPr anchorCtr="0" anchor="ctr" bIns="91425" lIns="91425" spcFirstLastPara="1" rIns="91425" wrap="square" tIns="91425">
+          <a:bodyPr spcFirstLastPara="1" wrap="square" lIns="91425" tIns="91425" rIns="91425" bIns="91425" anchor="ctr" anchorCtr="0">
             <a:normAutofit/>
           </a:bodyPr>
           <a:lstStyle>
@@ -3080,7 +3167,7 @@
             </a:lvl9pPr>
           </a:lstStyle>
           <a:p>
-            <a:pPr indent="0" lvl="0" marL="0" rtl="0" algn="r">
+            <a:pPr marL="0" lvl="0" indent="0" algn="r" rtl="0">
               <a:spcBef>
                 <a:spcPts val="0"/>
               </a:spcBef>
@@ -3106,11 +3193,11 @@
 </file>
 
 <file path=ppt/slideLayouts/slideLayout6.xml><?xml version="1.0" encoding="utf-8"?>
-<p:sldLayout xmlns:a="http://schemas.openxmlformats.org/drawingml/2006/main" xmlns:r="http://schemas.openxmlformats.org/officeDocument/2006/relationships" xmlns:mc="http://schemas.openxmlformats.org/markup-compatibility/2006" xmlns:mv="urn:schemas-microsoft-com:mac:vml" xmlns:p="http://schemas.openxmlformats.org/presentationml/2006/main" xmlns:c="http://schemas.openxmlformats.org/drawingml/2006/chart" xmlns:dgm="http://schemas.openxmlformats.org/drawingml/2006/diagram" xmlns:o="urn:schemas-microsoft-com:office:office" xmlns:v="urn:schemas-microsoft-com:vml" xmlns:pvml="urn:schemas-microsoft-com:office:powerpoint" xmlns:com="http://schemas.openxmlformats.org/drawingml/2006/compatibility" xmlns:p14="http://schemas.microsoft.com/office/powerpoint/2010/main" xmlns:p15="http://schemas.microsoft.com/office/powerpoint/2012/main" xmlns:ahyp="http://schemas.microsoft.com/office/drawing/2018/hyperlinkcolor" matchingName="One column text">
+<p:sldLayout xmlns:a="http://schemas.openxmlformats.org/drawingml/2006/main" xmlns:r="http://schemas.openxmlformats.org/officeDocument/2006/relationships" xmlns:p="http://schemas.openxmlformats.org/presentationml/2006/main" matchingName="One column text">
   <p:cSld name="ONE_COLUMN_TEXT">
     <p:spTree>
       <p:nvGrpSpPr>
-        <p:cNvPr id="28" name="Shape 28"/>
+        <p:cNvPr id="1" name="Shape 28"/>
         <p:cNvGrpSpPr/>
         <p:nvPr/>
       </p:nvGrpSpPr>
@@ -3125,7 +3212,9 @@
       <p:sp>
         <p:nvSpPr>
           <p:cNvPr id="29" name="Google Shape;29;p7"/>
-          <p:cNvSpPr txBox="1"/>
+          <p:cNvSpPr txBox="1">
+            <a:spLocks noGrp="1"/>
+          </p:cNvSpPr>
           <p:nvPr>
             <p:ph type="title"/>
           </p:nvPr>
@@ -3140,7 +3229,7 @@
           </a:prstGeom>
         </p:spPr>
         <p:txBody>
-          <a:bodyPr anchorCtr="0" anchor="b" bIns="91425" lIns="91425" spcFirstLastPara="1" rIns="91425" wrap="square" tIns="91425">
+          <a:bodyPr spcFirstLastPara="1" wrap="square" lIns="91425" tIns="91425" rIns="91425" bIns="91425" anchor="b" anchorCtr="0">
             <a:normAutofit/>
           </a:bodyPr>
           <a:lstStyle>
@@ -3244,15 +3333,19 @@
               <a:defRPr sz="2400"/>
             </a:lvl9pPr>
           </a:lstStyle>
-          <a:p/>
+          <a:p>
+            <a:endParaRPr/>
+          </a:p>
         </p:txBody>
       </p:sp>
       <p:sp>
         <p:nvSpPr>
           <p:cNvPr id="30" name="Google Shape;30;p7"/>
-          <p:cNvSpPr txBox="1"/>
+          <p:cNvSpPr txBox="1">
+            <a:spLocks noGrp="1"/>
+          </p:cNvSpPr>
           <p:nvPr>
-            <p:ph idx="1" type="body"/>
+            <p:ph type="body" idx="1"/>
           </p:nvPr>
         </p:nvSpPr>
         <p:spPr>
@@ -3265,11 +3358,11 @@
           </a:prstGeom>
         </p:spPr>
         <p:txBody>
-          <a:bodyPr anchorCtr="0" anchor="t" bIns="91425" lIns="91425" spcFirstLastPara="1" rIns="91425" wrap="square" tIns="91425">
+          <a:bodyPr spcFirstLastPara="1" wrap="square" lIns="91425" tIns="91425" rIns="91425" bIns="91425" anchor="t" anchorCtr="0">
             <a:normAutofit/>
           </a:bodyPr>
           <a:lstStyle>
-            <a:lvl1pPr indent="-304800" lvl="0" marL="457200">
+            <a:lvl1pPr marL="457200" lvl="0" indent="-304800">
               <a:spcBef>
                 <a:spcPts val="0"/>
               </a:spcBef>
@@ -3280,7 +3373,7 @@
               <a:buChar char="●"/>
               <a:defRPr sz="1200"/>
             </a:lvl1pPr>
-            <a:lvl2pPr indent="-304800" lvl="1" marL="914400">
+            <a:lvl2pPr marL="914400" lvl="1" indent="-304800">
               <a:spcBef>
                 <a:spcPts val="0"/>
               </a:spcBef>
@@ -3291,7 +3384,7 @@
               <a:buChar char="○"/>
               <a:defRPr sz="1200"/>
             </a:lvl2pPr>
-            <a:lvl3pPr indent="-304800" lvl="2" marL="1371600">
+            <a:lvl3pPr marL="1371600" lvl="2" indent="-304800">
               <a:spcBef>
                 <a:spcPts val="0"/>
               </a:spcBef>
@@ -3302,7 +3395,7 @@
               <a:buChar char="■"/>
               <a:defRPr sz="1200"/>
             </a:lvl3pPr>
-            <a:lvl4pPr indent="-304800" lvl="3" marL="1828800">
+            <a:lvl4pPr marL="1828800" lvl="3" indent="-304800">
               <a:spcBef>
                 <a:spcPts val="0"/>
               </a:spcBef>
@@ -3313,7 +3406,7 @@
               <a:buChar char="●"/>
               <a:defRPr sz="1200"/>
             </a:lvl4pPr>
-            <a:lvl5pPr indent="-304800" lvl="4" marL="2286000">
+            <a:lvl5pPr marL="2286000" lvl="4" indent="-304800">
               <a:spcBef>
                 <a:spcPts val="0"/>
               </a:spcBef>
@@ -3324,7 +3417,7 @@
               <a:buChar char="○"/>
               <a:defRPr sz="1200"/>
             </a:lvl5pPr>
-            <a:lvl6pPr indent="-304800" lvl="5" marL="2743200">
+            <a:lvl6pPr marL="2743200" lvl="5" indent="-304800">
               <a:spcBef>
                 <a:spcPts val="0"/>
               </a:spcBef>
@@ -3335,7 +3428,7 @@
               <a:buChar char="■"/>
               <a:defRPr sz="1200"/>
             </a:lvl6pPr>
-            <a:lvl7pPr indent="-304800" lvl="6" marL="3200400">
+            <a:lvl7pPr marL="3200400" lvl="6" indent="-304800">
               <a:spcBef>
                 <a:spcPts val="0"/>
               </a:spcBef>
@@ -3346,7 +3439,7 @@
               <a:buChar char="●"/>
               <a:defRPr sz="1200"/>
             </a:lvl7pPr>
-            <a:lvl8pPr indent="-304800" lvl="7" marL="3657600">
+            <a:lvl8pPr marL="3657600" lvl="7" indent="-304800">
               <a:spcBef>
                 <a:spcPts val="0"/>
               </a:spcBef>
@@ -3357,7 +3450,7 @@
               <a:buChar char="○"/>
               <a:defRPr sz="1200"/>
             </a:lvl8pPr>
-            <a:lvl9pPr indent="-304800" lvl="8" marL="4114800">
+            <a:lvl9pPr marL="4114800" lvl="8" indent="-304800">
               <a:spcBef>
                 <a:spcPts val="0"/>
               </a:spcBef>
@@ -3369,15 +3462,19 @@
               <a:defRPr sz="1200"/>
             </a:lvl9pPr>
           </a:lstStyle>
-          <a:p/>
+          <a:p>
+            <a:endParaRPr/>
+          </a:p>
         </p:txBody>
       </p:sp>
       <p:sp>
         <p:nvSpPr>
           <p:cNvPr id="31" name="Google Shape;31;p7"/>
-          <p:cNvSpPr txBox="1"/>
+          <p:cNvSpPr txBox="1">
+            <a:spLocks noGrp="1"/>
+          </p:cNvSpPr>
           <p:nvPr>
-            <p:ph idx="12" type="sldNum"/>
+            <p:ph type="sldNum" idx="12"/>
           </p:nvPr>
         </p:nvSpPr>
         <p:spPr>
@@ -3390,7 +3487,7 @@
           </a:prstGeom>
         </p:spPr>
         <p:txBody>
-          <a:bodyPr anchorCtr="0" anchor="ctr" bIns="91425" lIns="91425" spcFirstLastPara="1" rIns="91425" wrap="square" tIns="91425">
+          <a:bodyPr spcFirstLastPara="1" wrap="square" lIns="91425" tIns="91425" rIns="91425" bIns="91425" anchor="ctr" anchorCtr="0">
             <a:normAutofit/>
           </a:bodyPr>
           <a:lstStyle>
@@ -3432,7 +3529,7 @@
             </a:lvl9pPr>
           </a:lstStyle>
           <a:p>
-            <a:pPr indent="0" lvl="0" marL="0" rtl="0" algn="r">
+            <a:pPr marL="0" lvl="0" indent="0" algn="r" rtl="0">
               <a:spcBef>
                 <a:spcPts val="0"/>
               </a:spcBef>
@@ -3458,11 +3555,11 @@
 </file>
 
 <file path=ppt/slideLayouts/slideLayout7.xml><?xml version="1.0" encoding="utf-8"?>
-<p:sldLayout xmlns:a="http://schemas.openxmlformats.org/drawingml/2006/main" xmlns:r="http://schemas.openxmlformats.org/officeDocument/2006/relationships" xmlns:mc="http://schemas.openxmlformats.org/markup-compatibility/2006" xmlns:mv="urn:schemas-microsoft-com:mac:vml" xmlns:p="http://schemas.openxmlformats.org/presentationml/2006/main" xmlns:c="http://schemas.openxmlformats.org/drawingml/2006/chart" xmlns:dgm="http://schemas.openxmlformats.org/drawingml/2006/diagram" xmlns:o="urn:schemas-microsoft-com:office:office" xmlns:v="urn:schemas-microsoft-com:vml" xmlns:pvml="urn:schemas-microsoft-com:office:powerpoint" xmlns:com="http://schemas.openxmlformats.org/drawingml/2006/compatibility" xmlns:p14="http://schemas.microsoft.com/office/powerpoint/2010/main" xmlns:p15="http://schemas.microsoft.com/office/powerpoint/2012/main" xmlns:ahyp="http://schemas.microsoft.com/office/drawing/2018/hyperlinkcolor" matchingName="Main point">
+<p:sldLayout xmlns:a="http://schemas.openxmlformats.org/drawingml/2006/main" xmlns:r="http://schemas.openxmlformats.org/officeDocument/2006/relationships" xmlns:p="http://schemas.openxmlformats.org/presentationml/2006/main" matchingName="Main point">
   <p:cSld name="MAIN_POINT">
     <p:spTree>
       <p:nvGrpSpPr>
-        <p:cNvPr id="32" name="Shape 32"/>
+        <p:cNvPr id="1" name="Shape 32"/>
         <p:cNvGrpSpPr/>
         <p:nvPr/>
       </p:nvGrpSpPr>
@@ -3477,7 +3574,9 @@
       <p:sp>
         <p:nvSpPr>
           <p:cNvPr id="33" name="Google Shape;33;p8"/>
-          <p:cNvSpPr txBox="1"/>
+          <p:cNvSpPr txBox="1">
+            <a:spLocks noGrp="1"/>
+          </p:cNvSpPr>
           <p:nvPr>
             <p:ph type="title"/>
           </p:nvPr>
@@ -3492,7 +3591,7 @@
           </a:prstGeom>
         </p:spPr>
         <p:txBody>
-          <a:bodyPr anchorCtr="0" anchor="ctr" bIns="91425" lIns="91425" spcFirstLastPara="1" rIns="91425" wrap="square" tIns="91425">
+          <a:bodyPr spcFirstLastPara="1" wrap="square" lIns="91425" tIns="91425" rIns="91425" bIns="91425" anchor="ctr" anchorCtr="0">
             <a:normAutofit/>
           </a:bodyPr>
           <a:lstStyle>
@@ -3596,15 +3695,19 @@
               <a:defRPr sz="4800"/>
             </a:lvl9pPr>
           </a:lstStyle>
-          <a:p/>
+          <a:p>
+            <a:endParaRPr/>
+          </a:p>
         </p:txBody>
       </p:sp>
       <p:sp>
         <p:nvSpPr>
           <p:cNvPr id="34" name="Google Shape;34;p8"/>
-          <p:cNvSpPr txBox="1"/>
+          <p:cNvSpPr txBox="1">
+            <a:spLocks noGrp="1"/>
+          </p:cNvSpPr>
           <p:nvPr>
-            <p:ph idx="12" type="sldNum"/>
+            <p:ph type="sldNum" idx="12"/>
           </p:nvPr>
         </p:nvSpPr>
         <p:spPr>
@@ -3617,7 +3720,7 @@
           </a:prstGeom>
         </p:spPr>
         <p:txBody>
-          <a:bodyPr anchorCtr="0" anchor="ctr" bIns="91425" lIns="91425" spcFirstLastPara="1" rIns="91425" wrap="square" tIns="91425">
+          <a:bodyPr spcFirstLastPara="1" wrap="square" lIns="91425" tIns="91425" rIns="91425" bIns="91425" anchor="ctr" anchorCtr="0">
             <a:normAutofit/>
           </a:bodyPr>
           <a:lstStyle>
@@ -3659,7 +3762,7 @@
             </a:lvl9pPr>
           </a:lstStyle>
           <a:p>
-            <a:pPr indent="0" lvl="0" marL="0" rtl="0" algn="r">
+            <a:pPr marL="0" lvl="0" indent="0" algn="r" rtl="0">
               <a:spcBef>
                 <a:spcPts val="0"/>
               </a:spcBef>
@@ -3685,11 +3788,11 @@
 </file>
 
 <file path=ppt/slideLayouts/slideLayout8.xml><?xml version="1.0" encoding="utf-8"?>
-<p:sldLayout xmlns:a="http://schemas.openxmlformats.org/drawingml/2006/main" xmlns:r="http://schemas.openxmlformats.org/officeDocument/2006/relationships" xmlns:mc="http://schemas.openxmlformats.org/markup-compatibility/2006" xmlns:mv="urn:schemas-microsoft-com:mac:vml" xmlns:p="http://schemas.openxmlformats.org/presentationml/2006/main" xmlns:c="http://schemas.openxmlformats.org/drawingml/2006/chart" xmlns:dgm="http://schemas.openxmlformats.org/drawingml/2006/diagram" xmlns:o="urn:schemas-microsoft-com:office:office" xmlns:v="urn:schemas-microsoft-com:vml" xmlns:pvml="urn:schemas-microsoft-com:office:powerpoint" xmlns:com="http://schemas.openxmlformats.org/drawingml/2006/compatibility" xmlns:p14="http://schemas.microsoft.com/office/powerpoint/2010/main" xmlns:p15="http://schemas.microsoft.com/office/powerpoint/2012/main" xmlns:ahyp="http://schemas.microsoft.com/office/drawing/2018/hyperlinkcolor" matchingName="Section title and description">
+<p:sldLayout xmlns:a="http://schemas.openxmlformats.org/drawingml/2006/main" xmlns:r="http://schemas.openxmlformats.org/officeDocument/2006/relationships" xmlns:p="http://schemas.openxmlformats.org/presentationml/2006/main" matchingName="Section title and description">
   <p:cSld name="SECTION_TITLE_AND_DESCRIPTION">
     <p:spTree>
       <p:nvGrpSpPr>
-        <p:cNvPr id="35" name="Shape 35"/>
+        <p:cNvPr id="1" name="Shape 35"/>
         <p:cNvGrpSpPr/>
         <p:nvPr/>
       </p:nvGrpSpPr>
@@ -3723,12 +3826,12 @@
           </a:ln>
         </p:spPr>
         <p:txBody>
-          <a:bodyPr anchorCtr="0" anchor="ctr" bIns="91425" lIns="91425" spcFirstLastPara="1" rIns="91425" wrap="square" tIns="91425">
+          <a:bodyPr spcFirstLastPara="1" wrap="square" lIns="91425" tIns="91425" rIns="91425" bIns="91425" anchor="ctr" anchorCtr="0">
             <a:noAutofit/>
           </a:bodyPr>
           <a:lstStyle/>
           <a:p>
-            <a:pPr indent="0" lvl="0" marL="0" rtl="0" algn="l">
+            <a:pPr marL="0" lvl="0" indent="0" algn="l" rtl="0">
               <a:spcBef>
                 <a:spcPts val="0"/>
               </a:spcBef>
@@ -3737,9 +3840,6 @@
               </a:spcAft>
               <a:buNone/>
             </a:pPr>
-            <a:r>
-              <a:t/>
-            </a:r>
             <a:endParaRPr/>
           </a:p>
         </p:txBody>
@@ -3747,7 +3847,9 @@
       <p:sp>
         <p:nvSpPr>
           <p:cNvPr id="37" name="Google Shape;37;p9"/>
-          <p:cNvSpPr txBox="1"/>
+          <p:cNvSpPr txBox="1">
+            <a:spLocks noGrp="1"/>
+          </p:cNvSpPr>
           <p:nvPr>
             <p:ph type="title"/>
           </p:nvPr>
@@ -3762,7 +3864,7 @@
           </a:prstGeom>
         </p:spPr>
         <p:txBody>
-          <a:bodyPr anchorCtr="0" anchor="b" bIns="91425" lIns="91425" spcFirstLastPara="1" rIns="91425" wrap="square" tIns="91425">
+          <a:bodyPr spcFirstLastPara="1" wrap="square" lIns="91425" tIns="91425" rIns="91425" bIns="91425" anchor="b" anchorCtr="0">
             <a:normAutofit/>
           </a:bodyPr>
           <a:lstStyle>
@@ -3866,15 +3968,19 @@
               <a:defRPr sz="4200"/>
             </a:lvl9pPr>
           </a:lstStyle>
-          <a:p/>
+          <a:p>
+            <a:endParaRPr/>
+          </a:p>
         </p:txBody>
       </p:sp>
       <p:sp>
         <p:nvSpPr>
           <p:cNvPr id="38" name="Google Shape;38;p9"/>
-          <p:cNvSpPr txBox="1"/>
+          <p:cNvSpPr txBox="1">
+            <a:spLocks noGrp="1"/>
+          </p:cNvSpPr>
           <p:nvPr>
-            <p:ph idx="1" type="subTitle"/>
+            <p:ph type="subTitle" idx="1"/>
           </p:nvPr>
         </p:nvSpPr>
         <p:spPr>
@@ -3887,7 +3993,7 @@
           </a:prstGeom>
         </p:spPr>
         <p:txBody>
-          <a:bodyPr anchorCtr="0" anchor="t" bIns="91425" lIns="91425" spcFirstLastPara="1" rIns="91425" wrap="square" tIns="91425">
+          <a:bodyPr spcFirstLastPara="1" wrap="square" lIns="91425" tIns="91425" rIns="91425" bIns="91425" anchor="t" anchorCtr="0">
             <a:normAutofit/>
           </a:bodyPr>
           <a:lstStyle>
@@ -4018,15 +4124,19 @@
               <a:defRPr sz="2100"/>
             </a:lvl9pPr>
           </a:lstStyle>
-          <a:p/>
+          <a:p>
+            <a:endParaRPr/>
+          </a:p>
         </p:txBody>
       </p:sp>
       <p:sp>
         <p:nvSpPr>
           <p:cNvPr id="39" name="Google Shape;39;p9"/>
-          <p:cNvSpPr txBox="1"/>
+          <p:cNvSpPr txBox="1">
+            <a:spLocks noGrp="1"/>
+          </p:cNvSpPr>
           <p:nvPr>
-            <p:ph idx="2" type="body"/>
+            <p:ph type="body" idx="2"/>
           </p:nvPr>
         </p:nvSpPr>
         <p:spPr>
@@ -4039,11 +4149,11 @@
           </a:prstGeom>
         </p:spPr>
         <p:txBody>
-          <a:bodyPr anchorCtr="0" anchor="ctr" bIns="91425" lIns="91425" spcFirstLastPara="1" rIns="91425" wrap="square" tIns="91425">
+          <a:bodyPr spcFirstLastPara="1" wrap="square" lIns="91425" tIns="91425" rIns="91425" bIns="91425" anchor="ctr" anchorCtr="0">
             <a:normAutofit/>
           </a:bodyPr>
           <a:lstStyle>
-            <a:lvl1pPr indent="-342900" lvl="0" marL="457200">
+            <a:lvl1pPr marL="457200" lvl="0" indent="-342900">
               <a:spcBef>
                 <a:spcPts val="0"/>
               </a:spcBef>
@@ -4054,7 +4164,7 @@
               <a:buChar char="●"/>
               <a:defRPr/>
             </a:lvl1pPr>
-            <a:lvl2pPr indent="-317500" lvl="1" marL="914400">
+            <a:lvl2pPr marL="914400" lvl="1" indent="-317500">
               <a:spcBef>
                 <a:spcPts val="0"/>
               </a:spcBef>
@@ -4065,7 +4175,7 @@
               <a:buChar char="○"/>
               <a:defRPr/>
             </a:lvl2pPr>
-            <a:lvl3pPr indent="-317500" lvl="2" marL="1371600">
+            <a:lvl3pPr marL="1371600" lvl="2" indent="-317500">
               <a:spcBef>
                 <a:spcPts val="0"/>
               </a:spcBef>
@@ -4076,7 +4186,7 @@
               <a:buChar char="■"/>
               <a:defRPr/>
             </a:lvl3pPr>
-            <a:lvl4pPr indent="-317500" lvl="3" marL="1828800">
+            <a:lvl4pPr marL="1828800" lvl="3" indent="-317500">
               <a:spcBef>
                 <a:spcPts val="0"/>
               </a:spcBef>
@@ -4087,7 +4197,7 @@
               <a:buChar char="●"/>
               <a:defRPr/>
             </a:lvl4pPr>
-            <a:lvl5pPr indent="-317500" lvl="4" marL="2286000">
+            <a:lvl5pPr marL="2286000" lvl="4" indent="-317500">
               <a:spcBef>
                 <a:spcPts val="0"/>
               </a:spcBef>
@@ -4098,7 +4208,7 @@
               <a:buChar char="○"/>
               <a:defRPr/>
             </a:lvl5pPr>
-            <a:lvl6pPr indent="-317500" lvl="5" marL="2743200">
+            <a:lvl6pPr marL="2743200" lvl="5" indent="-317500">
               <a:spcBef>
                 <a:spcPts val="0"/>
               </a:spcBef>
@@ -4109,7 +4219,7 @@
               <a:buChar char="■"/>
               <a:defRPr/>
             </a:lvl6pPr>
-            <a:lvl7pPr indent="-317500" lvl="6" marL="3200400">
+            <a:lvl7pPr marL="3200400" lvl="6" indent="-317500">
               <a:spcBef>
                 <a:spcPts val="0"/>
               </a:spcBef>
@@ -4120,7 +4230,7 @@
               <a:buChar char="●"/>
               <a:defRPr/>
             </a:lvl7pPr>
-            <a:lvl8pPr indent="-317500" lvl="7" marL="3657600">
+            <a:lvl8pPr marL="3657600" lvl="7" indent="-317500">
               <a:spcBef>
                 <a:spcPts val="0"/>
               </a:spcBef>
@@ -4131,7 +4241,7 @@
               <a:buChar char="○"/>
               <a:defRPr/>
             </a:lvl8pPr>
-            <a:lvl9pPr indent="-317500" lvl="8" marL="4114800">
+            <a:lvl9pPr marL="4114800" lvl="8" indent="-317500">
               <a:spcBef>
                 <a:spcPts val="0"/>
               </a:spcBef>
@@ -4143,15 +4253,19 @@
               <a:defRPr/>
             </a:lvl9pPr>
           </a:lstStyle>
-          <a:p/>
+          <a:p>
+            <a:endParaRPr/>
+          </a:p>
         </p:txBody>
       </p:sp>
       <p:sp>
         <p:nvSpPr>
           <p:cNvPr id="40" name="Google Shape;40;p9"/>
-          <p:cNvSpPr txBox="1"/>
+          <p:cNvSpPr txBox="1">
+            <a:spLocks noGrp="1"/>
+          </p:cNvSpPr>
           <p:nvPr>
-            <p:ph idx="12" type="sldNum"/>
+            <p:ph type="sldNum" idx="12"/>
           </p:nvPr>
         </p:nvSpPr>
         <p:spPr>
@@ -4164,7 +4278,7 @@
           </a:prstGeom>
         </p:spPr>
         <p:txBody>
-          <a:bodyPr anchorCtr="0" anchor="ctr" bIns="91425" lIns="91425" spcFirstLastPara="1" rIns="91425" wrap="square" tIns="91425">
+          <a:bodyPr spcFirstLastPara="1" wrap="square" lIns="91425" tIns="91425" rIns="91425" bIns="91425" anchor="ctr" anchorCtr="0">
             <a:normAutofit/>
           </a:bodyPr>
           <a:lstStyle>
@@ -4206,7 +4320,7 @@
             </a:lvl9pPr>
           </a:lstStyle>
           <a:p>
-            <a:pPr indent="0" lvl="0" marL="0" rtl="0" algn="r">
+            <a:pPr marL="0" lvl="0" indent="0" algn="r" rtl="0">
               <a:spcBef>
                 <a:spcPts val="0"/>
               </a:spcBef>
@@ -4232,11 +4346,11 @@
 </file>
 
 <file path=ppt/slideLayouts/slideLayout9.xml><?xml version="1.0" encoding="utf-8"?>
-<p:sldLayout xmlns:a="http://schemas.openxmlformats.org/drawingml/2006/main" xmlns:r="http://schemas.openxmlformats.org/officeDocument/2006/relationships" xmlns:mc="http://schemas.openxmlformats.org/markup-compatibility/2006" xmlns:mv="urn:schemas-microsoft-com:mac:vml" xmlns:p="http://schemas.openxmlformats.org/presentationml/2006/main" xmlns:c="http://schemas.openxmlformats.org/drawingml/2006/chart" xmlns:dgm="http://schemas.openxmlformats.org/drawingml/2006/diagram" xmlns:o="urn:schemas-microsoft-com:office:office" xmlns:v="urn:schemas-microsoft-com:vml" xmlns:pvml="urn:schemas-microsoft-com:office:powerpoint" xmlns:com="http://schemas.openxmlformats.org/drawingml/2006/compatibility" xmlns:p14="http://schemas.microsoft.com/office/powerpoint/2010/main" xmlns:p15="http://schemas.microsoft.com/office/powerpoint/2012/main" xmlns:ahyp="http://schemas.microsoft.com/office/drawing/2018/hyperlinkcolor" matchingName="Caption">
+<p:sldLayout xmlns:a="http://schemas.openxmlformats.org/drawingml/2006/main" xmlns:r="http://schemas.openxmlformats.org/officeDocument/2006/relationships" xmlns:p="http://schemas.openxmlformats.org/presentationml/2006/main" matchingName="Caption">
   <p:cSld name="CAPTION_ONLY">
     <p:spTree>
       <p:nvGrpSpPr>
-        <p:cNvPr id="41" name="Shape 41"/>
+        <p:cNvPr id="1" name="Shape 41"/>
         <p:cNvGrpSpPr/>
         <p:nvPr/>
       </p:nvGrpSpPr>
@@ -4251,9 +4365,11 @@
       <p:sp>
         <p:nvSpPr>
           <p:cNvPr id="42" name="Google Shape;42;p10"/>
-          <p:cNvSpPr txBox="1"/>
+          <p:cNvSpPr txBox="1">
+            <a:spLocks noGrp="1"/>
+          </p:cNvSpPr>
           <p:nvPr>
-            <p:ph idx="1" type="body"/>
+            <p:ph type="body" idx="1"/>
           </p:nvPr>
         </p:nvSpPr>
         <p:spPr>
@@ -4266,11 +4382,11 @@
           </a:prstGeom>
         </p:spPr>
         <p:txBody>
-          <a:bodyPr anchorCtr="0" anchor="ctr" bIns="91425" lIns="91425" spcFirstLastPara="1" rIns="91425" wrap="square" tIns="91425">
+          <a:bodyPr spcFirstLastPara="1" wrap="square" lIns="91425" tIns="91425" rIns="91425" bIns="91425" anchor="ctr" anchorCtr="0">
             <a:normAutofit/>
           </a:bodyPr>
           <a:lstStyle>
-            <a:lvl1pPr indent="-228600" lvl="0" marL="457200">
+            <a:lvl1pPr marL="457200" lvl="0" indent="-228600">
               <a:lnSpc>
                 <a:spcPct val="100000"/>
               </a:lnSpc>
@@ -4285,15 +4401,19 @@
               <a:defRPr/>
             </a:lvl1pPr>
           </a:lstStyle>
-          <a:p/>
+          <a:p>
+            <a:endParaRPr/>
+          </a:p>
         </p:txBody>
       </p:sp>
       <p:sp>
         <p:nvSpPr>
           <p:cNvPr id="43" name="Google Shape;43;p10"/>
-          <p:cNvSpPr txBox="1"/>
+          <p:cNvSpPr txBox="1">
+            <a:spLocks noGrp="1"/>
+          </p:cNvSpPr>
           <p:nvPr>
-            <p:ph idx="12" type="sldNum"/>
+            <p:ph type="sldNum" idx="12"/>
           </p:nvPr>
         </p:nvSpPr>
         <p:spPr>
@@ -4306,7 +4426,7 @@
           </a:prstGeom>
         </p:spPr>
         <p:txBody>
-          <a:bodyPr anchorCtr="0" anchor="ctr" bIns="91425" lIns="91425" spcFirstLastPara="1" rIns="91425" wrap="square" tIns="91425">
+          <a:bodyPr spcFirstLastPara="1" wrap="square" lIns="91425" tIns="91425" rIns="91425" bIns="91425" anchor="ctr" anchorCtr="0">
             <a:normAutofit/>
           </a:bodyPr>
           <a:lstStyle>
@@ -4348,7 +4468,7 @@
             </a:lvl9pPr>
           </a:lstStyle>
           <a:p>
-            <a:pPr indent="0" lvl="0" marL="0" rtl="0" algn="r">
+            <a:pPr marL="0" lvl="0" indent="0" algn="r" rtl="0">
               <a:spcBef>
                 <a:spcPts val="0"/>
               </a:spcBef>
@@ -4374,18 +4494,19 @@
 </file>
 
 <file path=ppt/slideMasters/slideMaster1.xml><?xml version="1.0" encoding="utf-8"?>
-<p:sldMaster xmlns:a="http://schemas.openxmlformats.org/drawingml/2006/main" xmlns:r="http://schemas.openxmlformats.org/officeDocument/2006/relationships" xmlns:mc="http://schemas.openxmlformats.org/markup-compatibility/2006" xmlns:mv="urn:schemas-microsoft-com:mac:vml" xmlns:p="http://schemas.openxmlformats.org/presentationml/2006/main" xmlns:c="http://schemas.openxmlformats.org/drawingml/2006/chart" xmlns:dgm="http://schemas.openxmlformats.org/drawingml/2006/diagram" xmlns:o="urn:schemas-microsoft-com:office:office" xmlns:v="urn:schemas-microsoft-com:vml" xmlns:pvml="urn:schemas-microsoft-com:office:powerpoint" xmlns:com="http://schemas.openxmlformats.org/drawingml/2006/compatibility" xmlns:p14="http://schemas.microsoft.com/office/powerpoint/2010/main" xmlns:p15="http://schemas.microsoft.com/office/powerpoint/2012/main" xmlns:ahyp="http://schemas.microsoft.com/office/drawing/2018/hyperlinkcolor">
+<p:sldMaster xmlns:a="http://schemas.openxmlformats.org/drawingml/2006/main" xmlns:r="http://schemas.openxmlformats.org/officeDocument/2006/relationships" xmlns:p="http://schemas.openxmlformats.org/presentationml/2006/main">
   <p:cSld name="simple-light-2">
     <p:bg>
       <p:bgPr>
         <a:solidFill>
           <a:schemeClr val="lt1"/>
         </a:solidFill>
+        <a:effectLst/>
       </p:bgPr>
     </p:bg>
     <p:spTree>
       <p:nvGrpSpPr>
-        <p:cNvPr id="5" name="Shape 5"/>
+        <p:cNvPr id="1" name="Shape 5"/>
         <p:cNvGrpSpPr/>
         <p:nvPr/>
       </p:nvGrpSpPr>
@@ -4400,7 +4521,9 @@
       <p:sp>
         <p:nvSpPr>
           <p:cNvPr id="6" name="Google Shape;6;p1"/>
-          <p:cNvSpPr txBox="1"/>
+          <p:cNvSpPr txBox="1">
+            <a:spLocks noGrp="1"/>
+          </p:cNvSpPr>
           <p:nvPr>
             <p:ph type="title"/>
           </p:nvPr>
@@ -4419,7 +4542,7 @@
           </a:ln>
         </p:spPr>
         <p:txBody>
-          <a:bodyPr anchorCtr="0" anchor="t" bIns="91425" lIns="91425" spcFirstLastPara="1" rIns="91425" wrap="square" tIns="91425">
+          <a:bodyPr spcFirstLastPara="1" wrap="square" lIns="91425" tIns="91425" rIns="91425" bIns="91425" anchor="t" anchorCtr="0">
             <a:normAutofit/>
           </a:bodyPr>
           <a:lstStyle>
@@ -4586,15 +4709,19 @@
               </a:defRPr>
             </a:lvl9pPr>
           </a:lstStyle>
-          <a:p/>
+          <a:p>
+            <a:endParaRPr/>
+          </a:p>
         </p:txBody>
       </p:sp>
       <p:sp>
         <p:nvSpPr>
           <p:cNvPr id="7" name="Google Shape;7;p1"/>
-          <p:cNvSpPr txBox="1"/>
+          <p:cNvSpPr txBox="1">
+            <a:spLocks noGrp="1"/>
+          </p:cNvSpPr>
           <p:nvPr>
-            <p:ph idx="1" type="body"/>
+            <p:ph type="body" idx="1"/>
           </p:nvPr>
         </p:nvSpPr>
         <p:spPr>
@@ -4611,11 +4738,11 @@
           </a:ln>
         </p:spPr>
         <p:txBody>
-          <a:bodyPr anchorCtr="0" anchor="t" bIns="91425" lIns="91425" spcFirstLastPara="1" rIns="91425" wrap="square" tIns="91425">
+          <a:bodyPr spcFirstLastPara="1" wrap="square" lIns="91425" tIns="91425" rIns="91425" bIns="91425" anchor="t" anchorCtr="0">
             <a:normAutofit/>
           </a:bodyPr>
           <a:lstStyle>
-            <a:lvl1pPr indent="-342900" lvl="0" marL="457200">
+            <a:lvl1pPr marL="457200" lvl="0" indent="-342900">
               <a:lnSpc>
                 <a:spcPct val="115000"/>
               </a:lnSpc>
@@ -4636,7 +4763,7 @@
                 </a:solidFill>
               </a:defRPr>
             </a:lvl1pPr>
-            <a:lvl2pPr indent="-317500" lvl="1" marL="914400">
+            <a:lvl2pPr marL="914400" lvl="1" indent="-317500">
               <a:lnSpc>
                 <a:spcPct val="115000"/>
               </a:lnSpc>
@@ -4657,7 +4784,7 @@
                 </a:solidFill>
               </a:defRPr>
             </a:lvl2pPr>
-            <a:lvl3pPr indent="-317500" lvl="2" marL="1371600">
+            <a:lvl3pPr marL="1371600" lvl="2" indent="-317500">
               <a:lnSpc>
                 <a:spcPct val="115000"/>
               </a:lnSpc>
@@ -4678,7 +4805,7 @@
                 </a:solidFill>
               </a:defRPr>
             </a:lvl3pPr>
-            <a:lvl4pPr indent="-317500" lvl="3" marL="1828800">
+            <a:lvl4pPr marL="1828800" lvl="3" indent="-317500">
               <a:lnSpc>
                 <a:spcPct val="115000"/>
               </a:lnSpc>
@@ -4699,7 +4826,7 @@
                 </a:solidFill>
               </a:defRPr>
             </a:lvl4pPr>
-            <a:lvl5pPr indent="-317500" lvl="4" marL="2286000">
+            <a:lvl5pPr marL="2286000" lvl="4" indent="-317500">
               <a:lnSpc>
                 <a:spcPct val="115000"/>
               </a:lnSpc>
@@ -4720,7 +4847,7 @@
                 </a:solidFill>
               </a:defRPr>
             </a:lvl5pPr>
-            <a:lvl6pPr indent="-317500" lvl="5" marL="2743200">
+            <a:lvl6pPr marL="2743200" lvl="5" indent="-317500">
               <a:lnSpc>
                 <a:spcPct val="115000"/>
               </a:lnSpc>
@@ -4741,7 +4868,7 @@
                 </a:solidFill>
               </a:defRPr>
             </a:lvl6pPr>
-            <a:lvl7pPr indent="-317500" lvl="6" marL="3200400">
+            <a:lvl7pPr marL="3200400" lvl="6" indent="-317500">
               <a:lnSpc>
                 <a:spcPct val="115000"/>
               </a:lnSpc>
@@ -4762,7 +4889,7 @@
                 </a:solidFill>
               </a:defRPr>
             </a:lvl7pPr>
-            <a:lvl8pPr indent="-317500" lvl="7" marL="3657600">
+            <a:lvl8pPr marL="3657600" lvl="7" indent="-317500">
               <a:lnSpc>
                 <a:spcPct val="115000"/>
               </a:lnSpc>
@@ -4783,7 +4910,7 @@
                 </a:solidFill>
               </a:defRPr>
             </a:lvl8pPr>
-            <a:lvl9pPr indent="-317500" lvl="8" marL="4114800">
+            <a:lvl9pPr marL="4114800" lvl="8" indent="-317500">
               <a:lnSpc>
                 <a:spcPct val="115000"/>
               </a:lnSpc>
@@ -4805,15 +4932,19 @@
               </a:defRPr>
             </a:lvl9pPr>
           </a:lstStyle>
-          <a:p/>
+          <a:p>
+            <a:endParaRPr/>
+          </a:p>
         </p:txBody>
       </p:sp>
       <p:sp>
         <p:nvSpPr>
           <p:cNvPr id="8" name="Google Shape;8;p1"/>
-          <p:cNvSpPr txBox="1"/>
+          <p:cNvSpPr txBox="1">
+            <a:spLocks noGrp="1"/>
+          </p:cNvSpPr>
           <p:nvPr>
-            <p:ph idx="12" type="sldNum"/>
+            <p:ph type="sldNum" idx="12"/>
           </p:nvPr>
         </p:nvSpPr>
         <p:spPr>
@@ -4830,7 +4961,7 @@
           </a:ln>
         </p:spPr>
         <p:txBody>
-          <a:bodyPr anchorCtr="0" anchor="ctr" bIns="91425" lIns="91425" spcFirstLastPara="1" rIns="91425" wrap="square" tIns="91425">
+          <a:bodyPr spcFirstLastPara="1" wrap="square" lIns="91425" tIns="91425" rIns="91425" bIns="91425" anchor="ctr" anchorCtr="0">
             <a:normAutofit/>
           </a:bodyPr>
           <a:lstStyle>
@@ -4908,7 +5039,7 @@
             </a:lvl9pPr>
           </a:lstStyle>
           <a:p>
-            <a:pPr indent="0" lvl="0" marL="0" rtl="0" algn="r">
+            <a:pPr marL="0" lvl="0" indent="0" algn="r" rtl="0">
               <a:spcBef>
                 <a:spcPts val="0"/>
               </a:spcBef>
@@ -4927,7 +5058,7 @@
       </p:sp>
     </p:spTree>
   </p:cSld>
-  <p:clrMap accent1="accent1" accent2="accent2" accent3="accent3" accent4="accent4" accent5="accent5" accent6="accent6" bg1="lt1" bg2="dk2" tx1="dk1" tx2="lt2" folHlink="folHlink" hlink="hlink"/>
+  <p:clrMap bg1="lt1" tx1="dk1" bg2="dk2" tx2="lt2" accent1="accent1" accent2="accent2" accent3="accent3" accent4="accent4" accent5="accent5" accent6="accent6" hlink="hlink" folHlink="folHlink"/>
   <p:sldLayoutIdLst>
     <p:sldLayoutId id="2147483648" r:id="rId1"/>
     <p:sldLayoutId id="2147483649" r:id="rId2"/>
@@ -4941,10 +5072,10 @@
     <p:sldLayoutId id="2147483657" r:id="rId10"/>
     <p:sldLayoutId id="2147483658" r:id="rId11"/>
   </p:sldLayoutIdLst>
-  <p:hf dt="0" ftr="0" hdr="0" sldNum="0"/>
+  <p:hf sldNum="0" hdr="0" ftr="0" dt="0"/>
   <p:txStyles>
     <p:titleStyle>
-      <a:defPPr lvl="0" marR="0" rtl="0" algn="l">
+      <a:defPPr marR="0" lvl="0" algn="l" rtl="0">
         <a:lnSpc>
           <a:spcPct val="100000"/>
         </a:lnSpc>
@@ -4955,7 +5086,7 @@
           <a:spcPts val="0"/>
         </a:spcAft>
       </a:defPPr>
-      <a:lvl1pPr lvl="0" marR="0" rtl="0" algn="l">
+      <a:lvl1pPr marR="0" lvl="0" algn="l" rtl="0">
         <a:lnSpc>
           <a:spcPct val="100000"/>
         </a:lnSpc>
@@ -4969,7 +5100,7 @@
           <a:srgbClr val="000000"/>
         </a:buClr>
         <a:buFont typeface="Arial"/>
-        <a:defRPr b="0" i="0" sz="1400" u="none" cap="none" strike="noStrike">
+        <a:defRPr sz="1400" b="0" i="0" u="none" strike="noStrike" cap="none">
           <a:solidFill>
             <a:srgbClr val="000000"/>
           </a:solidFill>
@@ -4979,7 +5110,7 @@
           <a:sym typeface="Arial"/>
         </a:defRPr>
       </a:lvl1pPr>
-      <a:lvl2pPr lvl="1" marR="0" rtl="0" algn="l">
+      <a:lvl2pPr marR="0" lvl="1" algn="l" rtl="0">
         <a:lnSpc>
           <a:spcPct val="100000"/>
         </a:lnSpc>
@@ -4993,7 +5124,7 @@
           <a:srgbClr val="000000"/>
         </a:buClr>
         <a:buFont typeface="Arial"/>
-        <a:defRPr b="0" i="0" sz="1400" u="none" cap="none" strike="noStrike">
+        <a:defRPr sz="1400" b="0" i="0" u="none" strike="noStrike" cap="none">
           <a:solidFill>
             <a:srgbClr val="000000"/>
           </a:solidFill>
@@ -5003,7 +5134,7 @@
           <a:sym typeface="Arial"/>
         </a:defRPr>
       </a:lvl2pPr>
-      <a:lvl3pPr lvl="2" marR="0" rtl="0" algn="l">
+      <a:lvl3pPr marR="0" lvl="2" algn="l" rtl="0">
         <a:lnSpc>
           <a:spcPct val="100000"/>
         </a:lnSpc>
@@ -5017,7 +5148,7 @@
           <a:srgbClr val="000000"/>
         </a:buClr>
         <a:buFont typeface="Arial"/>
-        <a:defRPr b="0" i="0" sz="1400" u="none" cap="none" strike="noStrike">
+        <a:defRPr sz="1400" b="0" i="0" u="none" strike="noStrike" cap="none">
           <a:solidFill>
             <a:srgbClr val="000000"/>
           </a:solidFill>
@@ -5027,7 +5158,7 @@
           <a:sym typeface="Arial"/>
         </a:defRPr>
       </a:lvl3pPr>
-      <a:lvl4pPr lvl="3" marR="0" rtl="0" algn="l">
+      <a:lvl4pPr marR="0" lvl="3" algn="l" rtl="0">
         <a:lnSpc>
           <a:spcPct val="100000"/>
         </a:lnSpc>
@@ -5041,7 +5172,7 @@
           <a:srgbClr val="000000"/>
         </a:buClr>
         <a:buFont typeface="Arial"/>
-        <a:defRPr b="0" i="0" sz="1400" u="none" cap="none" strike="noStrike">
+        <a:defRPr sz="1400" b="0" i="0" u="none" strike="noStrike" cap="none">
           <a:solidFill>
             <a:srgbClr val="000000"/>
           </a:solidFill>
@@ -5051,7 +5182,7 @@
           <a:sym typeface="Arial"/>
         </a:defRPr>
       </a:lvl4pPr>
-      <a:lvl5pPr lvl="4" marR="0" rtl="0" algn="l">
+      <a:lvl5pPr marR="0" lvl="4" algn="l" rtl="0">
         <a:lnSpc>
           <a:spcPct val="100000"/>
         </a:lnSpc>
@@ -5065,7 +5196,7 @@
           <a:srgbClr val="000000"/>
         </a:buClr>
         <a:buFont typeface="Arial"/>
-        <a:defRPr b="0" i="0" sz="1400" u="none" cap="none" strike="noStrike">
+        <a:defRPr sz="1400" b="0" i="0" u="none" strike="noStrike" cap="none">
           <a:solidFill>
             <a:srgbClr val="000000"/>
           </a:solidFill>
@@ -5075,7 +5206,7 @@
           <a:sym typeface="Arial"/>
         </a:defRPr>
       </a:lvl5pPr>
-      <a:lvl6pPr lvl="5" marR="0" rtl="0" algn="l">
+      <a:lvl6pPr marR="0" lvl="5" algn="l" rtl="0">
         <a:lnSpc>
           <a:spcPct val="100000"/>
         </a:lnSpc>
@@ -5089,7 +5220,7 @@
           <a:srgbClr val="000000"/>
         </a:buClr>
         <a:buFont typeface="Arial"/>
-        <a:defRPr b="0" i="0" sz="1400" u="none" cap="none" strike="noStrike">
+        <a:defRPr sz="1400" b="0" i="0" u="none" strike="noStrike" cap="none">
           <a:solidFill>
             <a:srgbClr val="000000"/>
           </a:solidFill>
@@ -5099,7 +5230,7 @@
           <a:sym typeface="Arial"/>
         </a:defRPr>
       </a:lvl6pPr>
-      <a:lvl7pPr lvl="6" marR="0" rtl="0" algn="l">
+      <a:lvl7pPr marR="0" lvl="6" algn="l" rtl="0">
         <a:lnSpc>
           <a:spcPct val="100000"/>
         </a:lnSpc>
@@ -5113,7 +5244,7 @@
           <a:srgbClr val="000000"/>
         </a:buClr>
         <a:buFont typeface="Arial"/>
-        <a:defRPr b="0" i="0" sz="1400" u="none" cap="none" strike="noStrike">
+        <a:defRPr sz="1400" b="0" i="0" u="none" strike="noStrike" cap="none">
           <a:solidFill>
             <a:srgbClr val="000000"/>
           </a:solidFill>
@@ -5123,7 +5254,7 @@
           <a:sym typeface="Arial"/>
         </a:defRPr>
       </a:lvl7pPr>
-      <a:lvl8pPr lvl="7" marR="0" rtl="0" algn="l">
+      <a:lvl8pPr marR="0" lvl="7" algn="l" rtl="0">
         <a:lnSpc>
           <a:spcPct val="100000"/>
         </a:lnSpc>
@@ -5137,7 +5268,7 @@
           <a:srgbClr val="000000"/>
         </a:buClr>
         <a:buFont typeface="Arial"/>
-        <a:defRPr b="0" i="0" sz="1400" u="none" cap="none" strike="noStrike">
+        <a:defRPr sz="1400" b="0" i="0" u="none" strike="noStrike" cap="none">
           <a:solidFill>
             <a:srgbClr val="000000"/>
           </a:solidFill>
@@ -5147,7 +5278,7 @@
           <a:sym typeface="Arial"/>
         </a:defRPr>
       </a:lvl8pPr>
-      <a:lvl9pPr lvl="8" marR="0" rtl="0" algn="l">
+      <a:lvl9pPr marR="0" lvl="8" algn="l" rtl="0">
         <a:lnSpc>
           <a:spcPct val="100000"/>
         </a:lnSpc>
@@ -5161,7 +5292,7 @@
           <a:srgbClr val="000000"/>
         </a:buClr>
         <a:buFont typeface="Arial"/>
-        <a:defRPr b="0" i="0" sz="1400" u="none" cap="none" strike="noStrike">
+        <a:defRPr sz="1400" b="0" i="0" u="none" strike="noStrike" cap="none">
           <a:solidFill>
             <a:srgbClr val="000000"/>
           </a:solidFill>
@@ -5173,7 +5304,7 @@
       </a:lvl9pPr>
     </p:titleStyle>
     <p:bodyStyle>
-      <a:defPPr lvl="0" marR="0" rtl="0" algn="l">
+      <a:defPPr marR="0" lvl="0" algn="l" rtl="0">
         <a:lnSpc>
           <a:spcPct val="100000"/>
         </a:lnSpc>
@@ -5184,7 +5315,7 @@
           <a:spcPts val="0"/>
         </a:spcAft>
       </a:defPPr>
-      <a:lvl1pPr lvl="0" marR="0" rtl="0" algn="l">
+      <a:lvl1pPr marR="0" lvl="0" algn="l" rtl="0">
         <a:lnSpc>
           <a:spcPct val="100000"/>
         </a:lnSpc>
@@ -5198,7 +5329,7 @@
           <a:srgbClr val="000000"/>
         </a:buClr>
         <a:buFont typeface="Arial"/>
-        <a:defRPr b="0" i="0" sz="1400" u="none" cap="none" strike="noStrike">
+        <a:defRPr sz="1400" b="0" i="0" u="none" strike="noStrike" cap="none">
           <a:solidFill>
             <a:srgbClr val="000000"/>
           </a:solidFill>
@@ -5208,7 +5339,7 @@
           <a:sym typeface="Arial"/>
         </a:defRPr>
       </a:lvl1pPr>
-      <a:lvl2pPr lvl="1" marR="0" rtl="0" algn="l">
+      <a:lvl2pPr marR="0" lvl="1" algn="l" rtl="0">
         <a:lnSpc>
           <a:spcPct val="100000"/>
         </a:lnSpc>
@@ -5222,7 +5353,7 @@
           <a:srgbClr val="000000"/>
         </a:buClr>
         <a:buFont typeface="Arial"/>
-        <a:defRPr b="0" i="0" sz="1400" u="none" cap="none" strike="noStrike">
+        <a:defRPr sz="1400" b="0" i="0" u="none" strike="noStrike" cap="none">
           <a:solidFill>
             <a:srgbClr val="000000"/>
           </a:solidFill>
@@ -5232,7 +5363,7 @@
           <a:sym typeface="Arial"/>
         </a:defRPr>
       </a:lvl2pPr>
-      <a:lvl3pPr lvl="2" marR="0" rtl="0" algn="l">
+      <a:lvl3pPr marR="0" lvl="2" algn="l" rtl="0">
         <a:lnSpc>
           <a:spcPct val="100000"/>
         </a:lnSpc>
@@ -5246,7 +5377,7 @@
           <a:srgbClr val="000000"/>
         </a:buClr>
         <a:buFont typeface="Arial"/>
-        <a:defRPr b="0" i="0" sz="1400" u="none" cap="none" strike="noStrike">
+        <a:defRPr sz="1400" b="0" i="0" u="none" strike="noStrike" cap="none">
           <a:solidFill>
             <a:srgbClr val="000000"/>
           </a:solidFill>
@@ -5256,7 +5387,7 @@
           <a:sym typeface="Arial"/>
         </a:defRPr>
       </a:lvl3pPr>
-      <a:lvl4pPr lvl="3" marR="0" rtl="0" algn="l">
+      <a:lvl4pPr marR="0" lvl="3" algn="l" rtl="0">
         <a:lnSpc>
           <a:spcPct val="100000"/>
         </a:lnSpc>
@@ -5270,7 +5401,7 @@
           <a:srgbClr val="000000"/>
         </a:buClr>
         <a:buFont typeface="Arial"/>
-        <a:defRPr b="0" i="0" sz="1400" u="none" cap="none" strike="noStrike">
+        <a:defRPr sz="1400" b="0" i="0" u="none" strike="noStrike" cap="none">
           <a:solidFill>
             <a:srgbClr val="000000"/>
           </a:solidFill>
@@ -5280,7 +5411,7 @@
           <a:sym typeface="Arial"/>
         </a:defRPr>
       </a:lvl4pPr>
-      <a:lvl5pPr lvl="4" marR="0" rtl="0" algn="l">
+      <a:lvl5pPr marR="0" lvl="4" algn="l" rtl="0">
         <a:lnSpc>
           <a:spcPct val="100000"/>
         </a:lnSpc>
@@ -5294,7 +5425,7 @@
           <a:srgbClr val="000000"/>
         </a:buClr>
         <a:buFont typeface="Arial"/>
-        <a:defRPr b="0" i="0" sz="1400" u="none" cap="none" strike="noStrike">
+        <a:defRPr sz="1400" b="0" i="0" u="none" strike="noStrike" cap="none">
           <a:solidFill>
             <a:srgbClr val="000000"/>
           </a:solidFill>
@@ -5304,7 +5435,7 @@
           <a:sym typeface="Arial"/>
         </a:defRPr>
       </a:lvl5pPr>
-      <a:lvl6pPr lvl="5" marR="0" rtl="0" algn="l">
+      <a:lvl6pPr marR="0" lvl="5" algn="l" rtl="0">
         <a:lnSpc>
           <a:spcPct val="100000"/>
         </a:lnSpc>
@@ -5318,7 +5449,7 @@
           <a:srgbClr val="000000"/>
         </a:buClr>
         <a:buFont typeface="Arial"/>
-        <a:defRPr b="0" i="0" sz="1400" u="none" cap="none" strike="noStrike">
+        <a:defRPr sz="1400" b="0" i="0" u="none" strike="noStrike" cap="none">
           <a:solidFill>
             <a:srgbClr val="000000"/>
           </a:solidFill>
@@ -5328,7 +5459,7 @@
           <a:sym typeface="Arial"/>
         </a:defRPr>
       </a:lvl6pPr>
-      <a:lvl7pPr lvl="6" marR="0" rtl="0" algn="l">
+      <a:lvl7pPr marR="0" lvl="6" algn="l" rtl="0">
         <a:lnSpc>
           <a:spcPct val="100000"/>
         </a:lnSpc>
@@ -5342,7 +5473,7 @@
           <a:srgbClr val="000000"/>
         </a:buClr>
         <a:buFont typeface="Arial"/>
-        <a:defRPr b="0" i="0" sz="1400" u="none" cap="none" strike="noStrike">
+        <a:defRPr sz="1400" b="0" i="0" u="none" strike="noStrike" cap="none">
           <a:solidFill>
             <a:srgbClr val="000000"/>
           </a:solidFill>
@@ -5352,7 +5483,7 @@
           <a:sym typeface="Arial"/>
         </a:defRPr>
       </a:lvl7pPr>
-      <a:lvl8pPr lvl="7" marR="0" rtl="0" algn="l">
+      <a:lvl8pPr marR="0" lvl="7" algn="l" rtl="0">
         <a:lnSpc>
           <a:spcPct val="100000"/>
         </a:lnSpc>
@@ -5366,7 +5497,7 @@
           <a:srgbClr val="000000"/>
         </a:buClr>
         <a:buFont typeface="Arial"/>
-        <a:defRPr b="0" i="0" sz="1400" u="none" cap="none" strike="noStrike">
+        <a:defRPr sz="1400" b="0" i="0" u="none" strike="noStrike" cap="none">
           <a:solidFill>
             <a:srgbClr val="000000"/>
           </a:solidFill>
@@ -5376,7 +5507,7 @@
           <a:sym typeface="Arial"/>
         </a:defRPr>
       </a:lvl8pPr>
-      <a:lvl9pPr lvl="8" marR="0" rtl="0" algn="l">
+      <a:lvl9pPr marR="0" lvl="8" algn="l" rtl="0">
         <a:lnSpc>
           <a:spcPct val="100000"/>
         </a:lnSpc>
@@ -5390,7 +5521,7 @@
           <a:srgbClr val="000000"/>
         </a:buClr>
         <a:buFont typeface="Arial"/>
-        <a:defRPr b="0" i="0" sz="1400" u="none" cap="none" strike="noStrike">
+        <a:defRPr sz="1400" b="0" i="0" u="none" strike="noStrike" cap="none">
           <a:solidFill>
             <a:srgbClr val="000000"/>
           </a:solidFill>
@@ -5402,7 +5533,7 @@
       </a:lvl9pPr>
     </p:bodyStyle>
     <p:otherStyle>
-      <a:defPPr lvl="0" marR="0" rtl="0" algn="l">
+      <a:defPPr marR="0" lvl="0" algn="l" rtl="0">
         <a:lnSpc>
           <a:spcPct val="100000"/>
         </a:lnSpc>
@@ -5413,7 +5544,7 @@
           <a:spcPts val="0"/>
         </a:spcAft>
       </a:defPPr>
-      <a:lvl1pPr lvl="0" marR="0" rtl="0" algn="l">
+      <a:lvl1pPr marR="0" lvl="0" algn="l" rtl="0">
         <a:lnSpc>
           <a:spcPct val="100000"/>
         </a:lnSpc>
@@ -5427,7 +5558,7 @@
           <a:srgbClr val="000000"/>
         </a:buClr>
         <a:buFont typeface="Arial"/>
-        <a:defRPr b="0" i="0" sz="1400" u="none" cap="none" strike="noStrike">
+        <a:defRPr sz="1400" b="0" i="0" u="none" strike="noStrike" cap="none">
           <a:solidFill>
             <a:srgbClr val="000000"/>
           </a:solidFill>
@@ -5437,7 +5568,7 @@
           <a:sym typeface="Arial"/>
         </a:defRPr>
       </a:lvl1pPr>
-      <a:lvl2pPr lvl="1" marR="0" rtl="0" algn="l">
+      <a:lvl2pPr marR="0" lvl="1" algn="l" rtl="0">
         <a:lnSpc>
           <a:spcPct val="100000"/>
         </a:lnSpc>
@@ -5451,7 +5582,7 @@
           <a:srgbClr val="000000"/>
         </a:buClr>
         <a:buFont typeface="Arial"/>
-        <a:defRPr b="0" i="0" sz="1400" u="none" cap="none" strike="noStrike">
+        <a:defRPr sz="1400" b="0" i="0" u="none" strike="noStrike" cap="none">
           <a:solidFill>
             <a:srgbClr val="000000"/>
           </a:solidFill>
@@ -5461,7 +5592,7 @@
           <a:sym typeface="Arial"/>
         </a:defRPr>
       </a:lvl2pPr>
-      <a:lvl3pPr lvl="2" marR="0" rtl="0" algn="l">
+      <a:lvl3pPr marR="0" lvl="2" algn="l" rtl="0">
         <a:lnSpc>
           <a:spcPct val="100000"/>
         </a:lnSpc>
@@ -5475,7 +5606,7 @@
           <a:srgbClr val="000000"/>
         </a:buClr>
         <a:buFont typeface="Arial"/>
-        <a:defRPr b="0" i="0" sz="1400" u="none" cap="none" strike="noStrike">
+        <a:defRPr sz="1400" b="0" i="0" u="none" strike="noStrike" cap="none">
           <a:solidFill>
             <a:srgbClr val="000000"/>
           </a:solidFill>
@@ -5485,7 +5616,7 @@
           <a:sym typeface="Arial"/>
         </a:defRPr>
       </a:lvl3pPr>
-      <a:lvl4pPr lvl="3" marR="0" rtl="0" algn="l">
+      <a:lvl4pPr marR="0" lvl="3" algn="l" rtl="0">
         <a:lnSpc>
           <a:spcPct val="100000"/>
         </a:lnSpc>
@@ -5499,7 +5630,7 @@
           <a:srgbClr val="000000"/>
         </a:buClr>
         <a:buFont typeface="Arial"/>
-        <a:defRPr b="0" i="0" sz="1400" u="none" cap="none" strike="noStrike">
+        <a:defRPr sz="1400" b="0" i="0" u="none" strike="noStrike" cap="none">
           <a:solidFill>
             <a:srgbClr val="000000"/>
           </a:solidFill>
@@ -5509,7 +5640,7 @@
           <a:sym typeface="Arial"/>
         </a:defRPr>
       </a:lvl4pPr>
-      <a:lvl5pPr lvl="4" marR="0" rtl="0" algn="l">
+      <a:lvl5pPr marR="0" lvl="4" algn="l" rtl="0">
         <a:lnSpc>
           <a:spcPct val="100000"/>
         </a:lnSpc>
@@ -5523,7 +5654,7 @@
           <a:srgbClr val="000000"/>
         </a:buClr>
         <a:buFont typeface="Arial"/>
-        <a:defRPr b="0" i="0" sz="1400" u="none" cap="none" strike="noStrike">
+        <a:defRPr sz="1400" b="0" i="0" u="none" strike="noStrike" cap="none">
           <a:solidFill>
             <a:srgbClr val="000000"/>
           </a:solidFill>
@@ -5533,7 +5664,7 @@
           <a:sym typeface="Arial"/>
         </a:defRPr>
       </a:lvl5pPr>
-      <a:lvl6pPr lvl="5" marR="0" rtl="0" algn="l">
+      <a:lvl6pPr marR="0" lvl="5" algn="l" rtl="0">
         <a:lnSpc>
           <a:spcPct val="100000"/>
         </a:lnSpc>
@@ -5547,7 +5678,7 @@
           <a:srgbClr val="000000"/>
         </a:buClr>
         <a:buFont typeface="Arial"/>
-        <a:defRPr b="0" i="0" sz="1400" u="none" cap="none" strike="noStrike">
+        <a:defRPr sz="1400" b="0" i="0" u="none" strike="noStrike" cap="none">
           <a:solidFill>
             <a:srgbClr val="000000"/>
           </a:solidFill>
@@ -5557,7 +5688,7 @@
           <a:sym typeface="Arial"/>
         </a:defRPr>
       </a:lvl6pPr>
-      <a:lvl7pPr lvl="6" marR="0" rtl="0" algn="l">
+      <a:lvl7pPr marR="0" lvl="6" algn="l" rtl="0">
         <a:lnSpc>
           <a:spcPct val="100000"/>
         </a:lnSpc>
@@ -5571,7 +5702,7 @@
           <a:srgbClr val="000000"/>
         </a:buClr>
         <a:buFont typeface="Arial"/>
-        <a:defRPr b="0" i="0" sz="1400" u="none" cap="none" strike="noStrike">
+        <a:defRPr sz="1400" b="0" i="0" u="none" strike="noStrike" cap="none">
           <a:solidFill>
             <a:srgbClr val="000000"/>
           </a:solidFill>
@@ -5581,7 +5712,7 @@
           <a:sym typeface="Arial"/>
         </a:defRPr>
       </a:lvl7pPr>
-      <a:lvl8pPr lvl="7" marR="0" rtl="0" algn="l">
+      <a:lvl8pPr marR="0" lvl="7" algn="l" rtl="0">
         <a:lnSpc>
           <a:spcPct val="100000"/>
         </a:lnSpc>
@@ -5595,7 +5726,7 @@
           <a:srgbClr val="000000"/>
         </a:buClr>
         <a:buFont typeface="Arial"/>
-        <a:defRPr b="0" i="0" sz="1400" u="none" cap="none" strike="noStrike">
+        <a:defRPr sz="1400" b="0" i="0" u="none" strike="noStrike" cap="none">
           <a:solidFill>
             <a:srgbClr val="000000"/>
           </a:solidFill>
@@ -5605,7 +5736,7 @@
           <a:sym typeface="Arial"/>
         </a:defRPr>
       </a:lvl8pPr>
-      <a:lvl9pPr lvl="8" marR="0" rtl="0" algn="l">
+      <a:lvl9pPr marR="0" lvl="8" algn="l" rtl="0">
         <a:lnSpc>
           <a:spcPct val="100000"/>
         </a:lnSpc>
@@ -5619,7 +5750,7 @@
           <a:srgbClr val="000000"/>
         </a:buClr>
         <a:buFont typeface="Arial"/>
-        <a:defRPr b="0" i="0" sz="1400" u="none" cap="none" strike="noStrike">
+        <a:defRPr sz="1400" b="0" i="0" u="none" strike="noStrike" cap="none">
           <a:solidFill>
             <a:srgbClr val="000000"/>
           </a:solidFill>
@@ -5635,11 +5766,11 @@
 </file>
 
 <file path=ppt/slides/slide1.xml><?xml version="1.0" encoding="utf-8"?>
-<p:sld xmlns:a="http://schemas.openxmlformats.org/drawingml/2006/main" xmlns:r="http://schemas.openxmlformats.org/officeDocument/2006/relationships" xmlns:mc="http://schemas.openxmlformats.org/markup-compatibility/2006" xmlns:mv="urn:schemas-microsoft-com:mac:vml" xmlns:p="http://schemas.openxmlformats.org/presentationml/2006/main" xmlns:c="http://schemas.openxmlformats.org/drawingml/2006/chart" xmlns:dgm="http://schemas.openxmlformats.org/drawingml/2006/diagram" xmlns:o="urn:schemas-microsoft-com:office:office" xmlns:v="urn:schemas-microsoft-com:vml" xmlns:pvml="urn:schemas-microsoft-com:office:powerpoint" xmlns:com="http://schemas.openxmlformats.org/drawingml/2006/compatibility" xmlns:p14="http://schemas.microsoft.com/office/powerpoint/2010/main" xmlns:p15="http://schemas.microsoft.com/office/powerpoint/2012/main" xmlns:ahyp="http://schemas.microsoft.com/office/drawing/2018/hyperlinkcolor">
+<p:sld xmlns:a="http://schemas.openxmlformats.org/drawingml/2006/main" xmlns:r="http://schemas.openxmlformats.org/officeDocument/2006/relationships" xmlns:p="http://schemas.openxmlformats.org/presentationml/2006/main">
   <p:cSld>
     <p:spTree>
       <p:nvGrpSpPr>
-        <p:cNvPr id="53" name="Shape 53"/>
+        <p:cNvPr id="1" name="Shape 53"/>
         <p:cNvGrpSpPr/>
         <p:nvPr/>
       </p:nvGrpSpPr>
@@ -5654,7 +5785,9 @@
       <p:sp>
         <p:nvSpPr>
           <p:cNvPr id="54" name="Google Shape;54;p13"/>
-          <p:cNvSpPr txBox="1"/>
+          <p:cNvSpPr txBox="1">
+            <a:spLocks noGrp="1"/>
+          </p:cNvSpPr>
           <p:nvPr>
             <p:ph type="ctrTitle"/>
           </p:nvPr>
@@ -5669,12 +5802,12 @@
           </a:prstGeom>
         </p:spPr>
         <p:txBody>
-          <a:bodyPr anchorCtr="0" anchor="b" bIns="91425" lIns="91425" spcFirstLastPara="1" rIns="91425" wrap="square" tIns="91425">
+          <a:bodyPr spcFirstLastPara="1" wrap="square" lIns="91425" tIns="91425" rIns="91425" bIns="91425" anchor="b" anchorCtr="0">
             <a:normAutofit/>
           </a:bodyPr>
           <a:lstStyle/>
           <a:p>
-            <a:pPr indent="0" lvl="0" marL="0" rtl="0" algn="ctr">
+            <a:pPr marL="0" lvl="0" indent="0" algn="ctr" rtl="0">
               <a:spcBef>
                 <a:spcPts val="0"/>
               </a:spcBef>
@@ -5694,9 +5827,11 @@
       <p:sp>
         <p:nvSpPr>
           <p:cNvPr id="55" name="Google Shape;55;p13"/>
-          <p:cNvSpPr txBox="1"/>
+          <p:cNvSpPr txBox="1">
+            <a:spLocks noGrp="1"/>
+          </p:cNvSpPr>
           <p:nvPr>
-            <p:ph idx="1" type="subTitle"/>
+            <p:ph type="subTitle" idx="1"/>
           </p:nvPr>
         </p:nvSpPr>
         <p:spPr>
@@ -5709,12 +5844,12 @@
           </a:prstGeom>
         </p:spPr>
         <p:txBody>
-          <a:bodyPr anchorCtr="0" anchor="t" bIns="91425" lIns="91425" spcFirstLastPara="1" rIns="91425" wrap="square" tIns="91425">
+          <a:bodyPr spcFirstLastPara="1" wrap="square" lIns="91425" tIns="91425" rIns="91425" bIns="91425" anchor="t" anchorCtr="0">
             <a:normAutofit/>
           </a:bodyPr>
           <a:lstStyle/>
           <a:p>
-            <a:pPr indent="0" lvl="0" marL="0" rtl="0" algn="ctr">
+            <a:pPr marL="0" lvl="0" indent="0" algn="ctr" rtl="0">
               <a:spcBef>
                 <a:spcPts val="0"/>
               </a:spcBef>
@@ -5740,11 +5875,11 @@
 </file>
 
 <file path=ppt/slides/slide2.xml><?xml version="1.0" encoding="utf-8"?>
-<p:sld xmlns:a="http://schemas.openxmlformats.org/drawingml/2006/main" xmlns:r="http://schemas.openxmlformats.org/officeDocument/2006/relationships" xmlns:mc="http://schemas.openxmlformats.org/markup-compatibility/2006" xmlns:mv="urn:schemas-microsoft-com:mac:vml" xmlns:p="http://schemas.openxmlformats.org/presentationml/2006/main" xmlns:c="http://schemas.openxmlformats.org/drawingml/2006/chart" xmlns:dgm="http://schemas.openxmlformats.org/drawingml/2006/diagram" xmlns:o="urn:schemas-microsoft-com:office:office" xmlns:v="urn:schemas-microsoft-com:vml" xmlns:pvml="urn:schemas-microsoft-com:office:powerpoint" xmlns:com="http://schemas.openxmlformats.org/drawingml/2006/compatibility" xmlns:p14="http://schemas.microsoft.com/office/powerpoint/2010/main" xmlns:p15="http://schemas.microsoft.com/office/powerpoint/2012/main" xmlns:ahyp="http://schemas.microsoft.com/office/drawing/2018/hyperlinkcolor">
+<p:sld xmlns:a="http://schemas.openxmlformats.org/drawingml/2006/main" xmlns:r="http://schemas.openxmlformats.org/officeDocument/2006/relationships" xmlns:p="http://schemas.openxmlformats.org/presentationml/2006/main">
   <p:cSld>
     <p:spTree>
       <p:nvGrpSpPr>
-        <p:cNvPr id="59" name="Shape 59"/>
+        <p:cNvPr id="1" name="Shape 59"/>
         <p:cNvGrpSpPr/>
         <p:nvPr/>
       </p:nvGrpSpPr>
@@ -5759,7 +5894,9 @@
       <p:sp>
         <p:nvSpPr>
           <p:cNvPr id="60" name="Google Shape;60;p14"/>
-          <p:cNvSpPr txBox="1"/>
+          <p:cNvSpPr txBox="1">
+            <a:spLocks noGrp="1"/>
+          </p:cNvSpPr>
           <p:nvPr>
             <p:ph type="title"/>
           </p:nvPr>
@@ -5774,12 +5911,12 @@
           </a:prstGeom>
         </p:spPr>
         <p:txBody>
-          <a:bodyPr anchorCtr="0" anchor="t" bIns="91425" lIns="91425" spcFirstLastPara="1" rIns="91425" wrap="square" tIns="91425">
+          <a:bodyPr spcFirstLastPara="1" wrap="square" lIns="91425" tIns="91425" rIns="91425" bIns="91425" anchor="t" anchorCtr="0">
             <a:normAutofit fontScale="90000"/>
           </a:bodyPr>
           <a:lstStyle/>
           <a:p>
-            <a:pPr indent="0" lvl="0" marL="0" rtl="0" algn="l">
+            <a:pPr marL="0" lvl="0" indent="0" algn="l" rtl="0">
               <a:spcBef>
                 <a:spcPts val="0"/>
               </a:spcBef>
@@ -5799,9 +5936,11 @@
       <p:sp>
         <p:nvSpPr>
           <p:cNvPr id="61" name="Google Shape;61;p14"/>
-          <p:cNvSpPr txBox="1"/>
+          <p:cNvSpPr txBox="1">
+            <a:spLocks noGrp="1"/>
+          </p:cNvSpPr>
           <p:nvPr>
-            <p:ph idx="1" type="body"/>
+            <p:ph type="body" idx="1"/>
           </p:nvPr>
         </p:nvSpPr>
         <p:spPr>
@@ -5814,12 +5953,12 @@
           </a:prstGeom>
         </p:spPr>
         <p:txBody>
-          <a:bodyPr anchorCtr="0" anchor="t" bIns="91425" lIns="91425" spcFirstLastPara="1" rIns="91425" wrap="square" tIns="91425">
+          <a:bodyPr spcFirstLastPara="1" wrap="square" lIns="91425" tIns="91425" rIns="91425" bIns="91425" anchor="t" anchorCtr="0">
             <a:normAutofit/>
           </a:bodyPr>
           <a:lstStyle/>
           <a:p>
-            <a:pPr indent="0" lvl="0" marL="0" rtl="0" algn="l">
+            <a:pPr marL="0" lvl="0" indent="0" algn="l" rtl="0">
               <a:spcBef>
                 <a:spcPts val="0"/>
               </a:spcBef>
@@ -5829,17 +5968,13 @@
               <a:buNone/>
             </a:pPr>
             <a:r>
-              <a:rPr lang="en"/>
-              <a:t>TG g</a:t>
+              <a:rPr lang="en" dirty="0"/>
+              <a:t>TG goals for next 4 weeks</a:t>
             </a:r>
-            <a:r>
-              <a:rPr lang="en"/>
-              <a:t>oals for next 4 weeks</a:t>
-            </a:r>
-            <a:endParaRPr/>
+            <a:endParaRPr dirty="0"/>
           </a:p>
           <a:p>
-            <a:pPr indent="0" lvl="0" marL="0" rtl="0" algn="l">
+            <a:pPr marL="0" lvl="0" indent="0" algn="l" rtl="0">
               <a:spcBef>
                 <a:spcPts val="1200"/>
               </a:spcBef>
@@ -5849,10 +5984,10 @@
               <a:buNone/>
             </a:pPr>
             <a:r>
-              <a:rPr lang="en"/>
-              <a:t>Update on draft proposal</a:t>
+              <a:rPr lang="en" dirty="0"/>
+              <a:t>Updates on draft (Aote)</a:t>
             </a:r>
-            <a:endParaRPr/>
+            <a:endParaRPr dirty="0"/>
           </a:p>
         </p:txBody>
       </p:sp>
@@ -5865,11 +6000,11 @@
 </file>
 
 <file path=ppt/slides/slide3.xml><?xml version="1.0" encoding="utf-8"?>
-<p:sld xmlns:a="http://schemas.openxmlformats.org/drawingml/2006/main" xmlns:r="http://schemas.openxmlformats.org/officeDocument/2006/relationships" xmlns:mc="http://schemas.openxmlformats.org/markup-compatibility/2006" xmlns:mv="urn:schemas-microsoft-com:mac:vml" xmlns:p="http://schemas.openxmlformats.org/presentationml/2006/main" xmlns:c="http://schemas.openxmlformats.org/drawingml/2006/chart" xmlns:dgm="http://schemas.openxmlformats.org/drawingml/2006/diagram" xmlns:o="urn:schemas-microsoft-com:office:office" xmlns:v="urn:schemas-microsoft-com:vml" xmlns:pvml="urn:schemas-microsoft-com:office:powerpoint" xmlns:com="http://schemas.openxmlformats.org/drawingml/2006/compatibility" xmlns:p14="http://schemas.microsoft.com/office/powerpoint/2010/main" xmlns:p15="http://schemas.microsoft.com/office/powerpoint/2012/main" xmlns:ahyp="http://schemas.microsoft.com/office/drawing/2018/hyperlinkcolor">
+<p:sld xmlns:a="http://schemas.openxmlformats.org/drawingml/2006/main" xmlns:r="http://schemas.openxmlformats.org/officeDocument/2006/relationships" xmlns:p="http://schemas.openxmlformats.org/presentationml/2006/main">
   <p:cSld>
     <p:spTree>
       <p:nvGrpSpPr>
-        <p:cNvPr id="65" name="Shape 65"/>
+        <p:cNvPr id="1" name="Shape 65"/>
         <p:cNvGrpSpPr/>
         <p:nvPr/>
       </p:nvGrpSpPr>
@@ -5884,7 +6019,9 @@
       <p:sp>
         <p:nvSpPr>
           <p:cNvPr id="66" name="Google Shape;66;p15"/>
-          <p:cNvSpPr txBox="1"/>
+          <p:cNvSpPr txBox="1">
+            <a:spLocks noGrp="1"/>
+          </p:cNvSpPr>
           <p:nvPr>
             <p:ph type="title"/>
           </p:nvPr>
@@ -5899,12 +6036,12 @@
           </a:prstGeom>
         </p:spPr>
         <p:txBody>
-          <a:bodyPr anchorCtr="0" anchor="t" bIns="91425" lIns="91425" spcFirstLastPara="1" rIns="91425" wrap="square" tIns="91425">
+          <a:bodyPr spcFirstLastPara="1" wrap="square" lIns="91425" tIns="91425" rIns="91425" bIns="91425" anchor="t" anchorCtr="0">
             <a:normAutofit fontScale="90000"/>
           </a:bodyPr>
           <a:lstStyle/>
           <a:p>
-            <a:pPr indent="0" lvl="0" marL="0" rtl="0" algn="l">
+            <a:pPr marL="0" lvl="0" indent="0" algn="l" rtl="0">
               <a:spcBef>
                 <a:spcPts val="0"/>
               </a:spcBef>
@@ -5924,9 +6061,11 @@
       <p:sp>
         <p:nvSpPr>
           <p:cNvPr id="67" name="Google Shape;67;p15"/>
-          <p:cNvSpPr txBox="1"/>
+          <p:cNvSpPr txBox="1">
+            <a:spLocks noGrp="1"/>
+          </p:cNvSpPr>
           <p:nvPr>
-            <p:ph idx="1" type="body"/>
+            <p:ph type="body" idx="1"/>
           </p:nvPr>
         </p:nvSpPr>
         <p:spPr>
@@ -5939,12 +6078,12 @@
           </a:prstGeom>
         </p:spPr>
         <p:txBody>
-          <a:bodyPr anchorCtr="0" anchor="t" bIns="91425" lIns="91425" spcFirstLastPara="1" rIns="91425" wrap="square" tIns="91425">
+          <a:bodyPr spcFirstLastPara="1" wrap="square" lIns="91425" tIns="91425" rIns="91425" bIns="91425" anchor="t" anchorCtr="0">
             <a:normAutofit/>
           </a:bodyPr>
           <a:lstStyle/>
           <a:p>
-            <a:pPr indent="-342900" lvl="0" marL="457200" rtl="0" algn="l">
+            <a:pPr marL="457200" lvl="0" indent="-342900" algn="l" rtl="0">
               <a:spcBef>
                 <a:spcPts val="0"/>
               </a:spcBef>
@@ -5955,21 +6094,13 @@
               <a:buChar char="●"/>
             </a:pPr>
             <a:r>
-              <a:rPr lang="en"/>
-              <a:t>Get </a:t>
+              <a:rPr lang="en" dirty="0"/>
+              <a:t>TG charter review &amp; approval</a:t>
             </a:r>
-            <a:r>
-              <a:rPr lang="en"/>
-              <a:t>TG charter </a:t>
-            </a:r>
-            <a:r>
-              <a:rPr lang="en"/>
-              <a:t>review &amp; approval</a:t>
-            </a:r>
-            <a:endParaRPr/>
+            <a:endParaRPr dirty="0"/>
           </a:p>
           <a:p>
-            <a:pPr indent="-342900" lvl="0" marL="457200" rtl="0" algn="l">
+            <a:pPr marL="457200" lvl="0" indent="-342900" algn="l" rtl="0">
               <a:spcBef>
                 <a:spcPts val="0"/>
               </a:spcBef>
@@ -5980,17 +6111,13 @@
               <a:buChar char="●"/>
             </a:pPr>
             <a:r>
-              <a:rPr lang="en"/>
-              <a:t>Chair and Vice-chair </a:t>
+              <a:rPr lang="en" dirty="0"/>
+              <a:t>Chair and Vice-chair election</a:t>
             </a:r>
-            <a:r>
-              <a:rPr lang="en"/>
-              <a:t>election</a:t>
-            </a:r>
-            <a:endParaRPr/>
+            <a:endParaRPr dirty="0"/>
           </a:p>
           <a:p>
-            <a:pPr indent="-342900" lvl="0" marL="457200" rtl="0" algn="l">
+            <a:pPr marL="457200" lvl="0" indent="-342900" algn="l" rtl="0">
               <a:spcBef>
                 <a:spcPts val="0"/>
               </a:spcBef>
@@ -6001,10 +6128,10 @@
               <a:buChar char="●"/>
             </a:pPr>
             <a:r>
-              <a:rPr lang="en"/>
+              <a:rPr lang="en" dirty="0"/>
               <a:t>Ratification plan</a:t>
             </a:r>
-            <a:endParaRPr/>
+            <a:endParaRPr dirty="0"/>
           </a:p>
         </p:txBody>
       </p:sp>
@@ -6016,8 +6143,93 @@
 </p:sld>
 </file>
 
+<file path=ppt/slides/slide4.xml><?xml version="1.0" encoding="utf-8"?>
+<p:sld xmlns:a="http://schemas.openxmlformats.org/drawingml/2006/main" xmlns:r="http://schemas.openxmlformats.org/officeDocument/2006/relationships" xmlns:p="http://schemas.openxmlformats.org/presentationml/2006/main">
+  <p:cSld>
+    <p:spTree>
+      <p:nvGrpSpPr>
+        <p:cNvPr id="1" name=""/>
+        <p:cNvGrpSpPr/>
+        <p:nvPr/>
+      </p:nvGrpSpPr>
+      <p:grpSpPr>
+        <a:xfrm>
+          <a:off x="0" y="0"/>
+          <a:ext cx="0" cy="0"/>
+          <a:chOff x="0" y="0"/>
+          <a:chExt cx="0" cy="0"/>
+        </a:xfrm>
+      </p:grpSpPr>
+      <p:sp>
+        <p:nvSpPr>
+          <p:cNvPr id="2" name="Title 1">
+            <a:extLst>
+              <a:ext uri="{FF2B5EF4-FFF2-40B4-BE49-F238E27FC236}">
+                <a16:creationId xmlns:a16="http://schemas.microsoft.com/office/drawing/2014/main" id="{9425D4B6-A6D8-6D6E-5B5E-1C34B24668CB}"/>
+              </a:ext>
+            </a:extLst>
+          </p:cNvPr>
+          <p:cNvSpPr>
+            <a:spLocks noGrp="1"/>
+          </p:cNvSpPr>
+          <p:nvPr>
+            <p:ph type="title"/>
+          </p:nvPr>
+        </p:nvSpPr>
+        <p:spPr/>
+        <p:txBody>
+          <a:bodyPr>
+            <a:normAutofit fontScale="90000"/>
+          </a:bodyPr>
+          <a:lstStyle/>
+          <a:p>
+            <a:r>
+              <a:rPr lang="en-US" dirty="0"/>
+              <a:t>Spec update (Aote)</a:t>
+            </a:r>
+          </a:p>
+        </p:txBody>
+      </p:sp>
+      <p:sp>
+        <p:nvSpPr>
+          <p:cNvPr id="3" name="Text Placeholder 2">
+            <a:extLst>
+              <a:ext uri="{FF2B5EF4-FFF2-40B4-BE49-F238E27FC236}">
+                <a16:creationId xmlns:a16="http://schemas.microsoft.com/office/drawing/2014/main" id="{D98D0EE7-9780-4342-C83B-18498D97CA60}"/>
+              </a:ext>
+            </a:extLst>
+          </p:cNvPr>
+          <p:cNvSpPr>
+            <a:spLocks noGrp="1"/>
+          </p:cNvSpPr>
+          <p:nvPr>
+            <p:ph type="body" idx="1"/>
+          </p:nvPr>
+        </p:nvSpPr>
+        <p:spPr/>
+        <p:txBody>
+          <a:bodyPr/>
+          <a:lstStyle/>
+          <a:p>
+            <a:endParaRPr lang="en-US"/>
+          </a:p>
+        </p:txBody>
+      </p:sp>
+    </p:spTree>
+    <p:extLst>
+      <p:ext uri="{BB962C8B-B14F-4D97-AF65-F5344CB8AC3E}">
+        <p14:creationId xmlns:p14="http://schemas.microsoft.com/office/powerpoint/2010/main" val="863568154"/>
+      </p:ext>
+    </p:extLst>
+  </p:cSld>
+  <p:clrMapOvr>
+    <a:masterClrMapping/>
+  </p:clrMapOvr>
+</p:sld>
+</file>
+
 <file path=ppt/theme/theme1.xml><?xml version="1.0" encoding="utf-8"?>
-<a:theme xmlns:a="http://schemas.openxmlformats.org/drawingml/2006/main" xmlns:r="http://schemas.openxmlformats.org/officeDocument/2006/relationships" name="Simple Light">
+<a:theme xmlns:a="http://schemas.openxmlformats.org/drawingml/2006/main" name="Simple Light">
   <a:themeElements>
     <a:clrScheme name="Simple Light">
       <a:dk1>
@@ -6292,11 +6504,13 @@
       </a:bgFillStyleLst>
     </a:fmtScheme>
   </a:themeElements>
+  <a:objectDefaults/>
+  <a:extraClrSchemeLst/>
 </a:theme>
 </file>
 
 <file path=ppt/theme/theme2.xml><?xml version="1.0" encoding="utf-8"?>
-<a:theme xmlns:a="http://schemas.openxmlformats.org/drawingml/2006/main" xmlns:r="http://schemas.openxmlformats.org/officeDocument/2006/relationships">
+<a:theme xmlns:a="http://schemas.openxmlformats.org/drawingml/2006/main">
   <a:themeElements>
     <a:clrScheme name="Default">
       <a:dk1>
@@ -6571,5 +6785,7 @@
       </a:bgFillStyleLst>
     </a:fmtScheme>
   </a:themeElements>
+  <a:objectDefaults/>
+  <a:extraClrSchemeLst/>
 </a:theme>
 </file>
</xml_diff>